<commit_message>
tims prefinal slides + control and guidance diagrams
</commit_message>
<xml_diff>
--- a/docproject/official_ahns/presentations/tim_semester1.pptx
+++ b/docproject/official_ahns/presentations/tim_semester1.pptx
@@ -5,7 +5,7 @@
     <p:sldMasterId r:id="rId1"/>
   </p:sldMasterIdLst>
   <p:notesMasterIdLst>
-    <p:notesMasterId r:id="rId19"/>
+    <p:notesMasterId r:id="rId20"/>
   </p:notesMasterIdLst>
   <p:sldIdLst>
     <p:sldId id="380" r:id="rId2"/>
@@ -13,18 +13,19 @@
     <p:sldId id="382" r:id="rId4"/>
     <p:sldId id="384" r:id="rId5"/>
     <p:sldId id="386" r:id="rId6"/>
-    <p:sldId id="391" r:id="rId7"/>
-    <p:sldId id="400" r:id="rId8"/>
-    <p:sldId id="389" r:id="rId9"/>
-    <p:sldId id="390" r:id="rId10"/>
-    <p:sldId id="396" r:id="rId11"/>
-    <p:sldId id="399" r:id="rId12"/>
-    <p:sldId id="401" r:id="rId13"/>
-    <p:sldId id="388" r:id="rId14"/>
-    <p:sldId id="392" r:id="rId15"/>
-    <p:sldId id="393" r:id="rId16"/>
-    <p:sldId id="394" r:id="rId17"/>
+    <p:sldId id="400" r:id="rId7"/>
+    <p:sldId id="389" r:id="rId8"/>
+    <p:sldId id="390" r:id="rId9"/>
+    <p:sldId id="396" r:id="rId10"/>
+    <p:sldId id="399" r:id="rId11"/>
+    <p:sldId id="401" r:id="rId12"/>
+    <p:sldId id="388" r:id="rId13"/>
+    <p:sldId id="392" r:id="rId14"/>
+    <p:sldId id="393" r:id="rId15"/>
+    <p:sldId id="394" r:id="rId16"/>
+    <p:sldId id="402" r:id="rId17"/>
     <p:sldId id="395" r:id="rId18"/>
+    <p:sldId id="403" r:id="rId19"/>
   </p:sldIdLst>
   <p:sldSz cx="9144000" cy="6858000" type="screen4x3"/>
   <p:notesSz cx="6858000" cy="9144000"/>
@@ -7734,7 +7735,7 @@
             <a:fld id="{564FCFA0-726F-477B-BEA1-4EBA104729ED}" type="slidenum">
               <a:rPr lang="en-AU" smtClean="0"/>
               <a:pPr/>
-              <a:t>7</a:t>
+              <a:t>6</a:t>
             </a:fld>
             <a:endParaRPr lang="en-AU"/>
           </a:p>
@@ -11565,7 +11566,7 @@
           <a:p>
             <a:r>
               <a:rPr lang="en-US" dirty="0" smtClean="0"/>
-              <a:t>The Widgets</a:t>
+              <a:t>Data Plotters &amp; Artificial Horizon</a:t>
             </a:r>
             <a:endParaRPr lang="en-US" dirty="0"/>
           </a:p>
@@ -11610,89 +11611,69 @@
         <p:spPr/>
         <p:txBody>
           <a:bodyPr>
-            <a:normAutofit fontScale="92500" lnSpcReduction="20000"/>
+            <a:normAutofit/>
           </a:bodyPr>
           <a:lstStyle/>
           <a:p>
             <a:r>
-              <a:rPr lang="en-US" dirty="0" err="1" smtClean="0"/>
-              <a:t>WiFi</a:t>
-            </a:r>
-            <a:r>
               <a:rPr lang="en-US" dirty="0" smtClean="0"/>
-              <a:t> Communications</a:t>
+              <a:t>Artificial Horizon</a:t>
             </a:r>
           </a:p>
           <a:p>
             <a:pPr lvl="1"/>
             <a:r>
               <a:rPr lang="en-US" dirty="0" smtClean="0"/>
-              <a:t>Configure, Control and Monitor </a:t>
+              <a:t>2009 OpenGL Attitude Display</a:t>
+            </a:r>
+          </a:p>
+          <a:p>
+            <a:pPr lvl="1"/>
+            <a:r>
+              <a:rPr lang="en-US" dirty="0" smtClean="0"/>
+              <a:t>Roll and Pitch</a:t>
+            </a:r>
+          </a:p>
+          <a:p>
+            <a:r>
+              <a:rPr lang="en-US" dirty="0" smtClean="0"/>
+              <a:t>Data Plotter</a:t>
+            </a:r>
+          </a:p>
+          <a:p>
+            <a:pPr lvl="1"/>
+            <a:r>
+              <a:rPr lang="en-US" dirty="0" smtClean="0"/>
+              <a:t>Real-time data plotting</a:t>
+            </a:r>
+          </a:p>
+          <a:p>
+            <a:pPr lvl="1"/>
+            <a:r>
+              <a:rPr lang="en-US" dirty="0" smtClean="0"/>
+              <a:t>Raw Sensor Data, State Data,</a:t>
             </a:r>
             <a:br>
               <a:rPr lang="en-US" dirty="0" smtClean="0"/>
             </a:br>
             <a:r>
               <a:rPr lang="en-US" dirty="0" smtClean="0"/>
-              <a:t>UDP Telemetry</a:t>
-            </a:r>
-          </a:p>
-          <a:p>
+              <a:t> Control Data, System Status…</a:t>
+            </a:r>
+          </a:p>
+          <a:p>
+            <a:pPr lvl="1"/>
             <a:r>
               <a:rPr lang="en-US" dirty="0" smtClean="0"/>
-              <a:t>Received Console</a:t>
-            </a:r>
-          </a:p>
-          <a:p>
-            <a:pPr lvl="1"/>
-            <a:r>
-              <a:rPr lang="en-US" dirty="0" smtClean="0"/>
-              <a:t>Report telemetry messages and </a:t>
+              <a:t>Support for multiple</a:t>
             </a:r>
             <a:br>
               <a:rPr lang="en-US" dirty="0" smtClean="0"/>
             </a:br>
             <a:r>
               <a:rPr lang="en-US" dirty="0" smtClean="0"/>
-              <a:t>enable inspection</a:t>
-            </a:r>
-          </a:p>
-          <a:p>
-            <a:r>
-              <a:rPr lang="en-US" dirty="0" smtClean="0"/>
-              <a:t>System Status</a:t>
-            </a:r>
-          </a:p>
-          <a:p>
-            <a:pPr lvl="1"/>
-            <a:r>
-              <a:rPr lang="en-US" dirty="0" smtClean="0"/>
-              <a:t>Provide visual notifications of </a:t>
-            </a:r>
-            <a:br>
-              <a:rPr lang="en-US" dirty="0" smtClean="0"/>
-            </a:br>
-            <a:r>
-              <a:rPr lang="en-US" dirty="0" smtClean="0"/>
-              <a:t>airborne system status</a:t>
-            </a:r>
-          </a:p>
-          <a:p>
-            <a:r>
-              <a:rPr lang="en-US" dirty="0" smtClean="0"/>
-              <a:t>Data Logger</a:t>
-            </a:r>
-          </a:p>
-          <a:p>
-            <a:pPr lvl="1"/>
-            <a:r>
-              <a:rPr lang="en-US" dirty="0" smtClean="0"/>
-              <a:t>CSV Log of all Received Airborne Data</a:t>
-            </a:r>
-          </a:p>
-          <a:p>
-            <a:pPr lvl="1"/>
-            <a:endParaRPr lang="en-US" dirty="0" smtClean="0"/>
+              <a:t>data plotters</a:t>
+            </a:r>
           </a:p>
         </p:txBody>
       </p:sp>
@@ -11706,15 +11687,15 @@
         </p:nvPicPr>
         <p:blipFill>
           <a:blip r:embed="rId2"/>
-          <a:srcRect l="86541" t="43432" b="44915"/>
+          <a:srcRect l="57031" t="4237" r="13459" b="27966"/>
           <a:stretch>
             <a:fillRect/>
           </a:stretch>
         </p:blipFill>
         <p:spPr>
           <a:xfrm>
-            <a:off x="6096000" y="1752600"/>
-            <a:ext cx="2710875" cy="838200"/>
+            <a:off x="5448300" y="3276600"/>
+            <a:ext cx="3695700" cy="3032369"/>
           </a:xfrm>
           <a:prstGeom prst="rect">
             <a:avLst/>
@@ -11741,50 +11722,15 @@
         </p:nvPicPr>
         <p:blipFill>
           <a:blip r:embed="rId2"/>
-          <a:srcRect l="86541" t="55085" b="26907"/>
+          <a:srcRect l="86759" t="4237" b="70339"/>
           <a:stretch>
             <a:fillRect/>
           </a:stretch>
         </p:blipFill>
         <p:spPr>
           <a:xfrm>
-            <a:off x="6096000" y="2743200"/>
-            <a:ext cx="2710875" cy="1295400"/>
-          </a:xfrm>
-          <a:prstGeom prst="rect">
-            <a:avLst/>
-          </a:prstGeom>
-          <a:ln>
-            <a:noFill/>
-          </a:ln>
-          <a:effectLst>
-            <a:outerShdw blurRad="292100" dist="139700" dir="2700000" algn="tl" rotWithShape="0">
-              <a:srgbClr val="333333">
-                <a:alpha val="65000"/>
-              </a:srgbClr>
-            </a:outerShdw>
-          </a:effectLst>
-        </p:spPr>
-      </p:pic>
-      <p:pic>
-        <p:nvPicPr>
-          <p:cNvPr id="8" name="Picture 7" descr="GCS_Screenshot.png"/>
-          <p:cNvPicPr>
-            <a:picLocks noChangeAspect="1"/>
-          </p:cNvPicPr>
-          <p:nvPr/>
-        </p:nvPicPr>
-        <p:blipFill>
-          <a:blip r:embed="rId2"/>
-          <a:srcRect l="86541" t="29661" b="56568"/>
-          <a:stretch>
-            <a:fillRect/>
-          </a:stretch>
-        </p:blipFill>
-        <p:spPr>
-          <a:xfrm>
-            <a:off x="6096000" y="4191000"/>
-            <a:ext cx="2710875" cy="990600"/>
+            <a:off x="6477000" y="1371600"/>
+            <a:ext cx="2667000" cy="1828800"/>
           </a:xfrm>
           <a:prstGeom prst="rect">
             <a:avLst/>
@@ -11803,7 +11749,7 @@
       </p:pic>
       <p:sp>
         <p:nvSpPr>
-          <p:cNvPr id="9" name="Footer Placeholder 5"/>
+          <p:cNvPr id="7" name="Footer Placeholder 5"/>
           <p:cNvSpPr>
             <a:spLocks noGrp="1"/>
           </p:cNvSpPr>
@@ -11822,7 +11768,7 @@
           <a:lstStyle/>
           <a:p>
             <a:r>
-              <a:rPr lang="en-AU" smtClean="0"/>
+              <a:rPr lang="en-AU" dirty="0" smtClean="0"/>
               <a:t>Tim Molloy</a:t>
             </a:r>
             <a:endParaRPr lang="en-AU" dirty="0"/>
@@ -11921,7 +11867,7 @@
                                           </p:stCondLst>
                                         </p:cTn>
                                         <p:tgtEl>
-                                          <p:spTgt spid="8"/>
+                                          <p:spTgt spid="5"/>
                                         </p:tgtEl>
                                         <p:attrNameLst>
                                           <p:attrName>style.visibility</p:attrName>
@@ -11935,7 +11881,7 @@
                                       <p:cBhvr>
                                         <p:cTn id="12" dur="1000"/>
                                         <p:tgtEl>
-                                          <p:spTgt spid="8"/>
+                                          <p:spTgt spid="5"/>
                                         </p:tgtEl>
                                       </p:cBhvr>
                                     </p:animEffect>
@@ -12002,12 +11948,14 @@
         </p:nvSpPr>
         <p:spPr/>
         <p:txBody>
-          <a:bodyPr/>
+          <a:bodyPr>
+            <a:normAutofit/>
+          </a:bodyPr>
           <a:lstStyle/>
           <a:p>
             <a:r>
               <a:rPr lang="en-US" dirty="0" smtClean="0"/>
-              <a:t>Data Plotters &amp; Artificial Horizon</a:t>
+              <a:t>Following Controller Design…</a:t>
             </a:r>
             <a:endParaRPr lang="en-US" dirty="0"/>
           </a:p>
@@ -12035,7 +11983,7 @@
               <a:pPr/>
               <a:t>11</a:t>
             </a:fld>
-            <a:endParaRPr lang="en-AU" dirty="0"/>
+            <a:endParaRPr lang="en-AU"/>
           </a:p>
         </p:txBody>
       </p:sp>
@@ -12052,167 +12000,130 @@
         <p:spPr/>
         <p:txBody>
           <a:bodyPr>
-            <a:normAutofit/>
+            <a:normAutofit fontScale="85000" lnSpcReduction="20000"/>
           </a:bodyPr>
           <a:lstStyle/>
           <a:p>
-            <a:r>
-              <a:rPr lang="en-US" dirty="0" smtClean="0"/>
-              <a:t>Artificial Horizon</a:t>
+            <a:pPr lvl="0"/>
+            <a:r>
+              <a:rPr lang="en-AU" dirty="0" smtClean="0"/>
+              <a:t>Attitude Control Trims and Bounds</a:t>
             </a:r>
           </a:p>
           <a:p>
             <a:pPr lvl="1"/>
             <a:r>
-              <a:rPr lang="en-US" dirty="0" smtClean="0"/>
-              <a:t>2009 OpenGL Attitude Display</a:t>
+              <a:rPr lang="en-AU" i="1" dirty="0" smtClean="0"/>
+              <a:t>Set the trims and bounds on the roll, pitch and yaw control loops.</a:t>
+            </a:r>
+            <a:endParaRPr lang="en-AU" dirty="0" smtClean="0"/>
+          </a:p>
+          <a:p>
+            <a:pPr lvl="0"/>
+            <a:r>
+              <a:rPr lang="en-AU" dirty="0" smtClean="0"/>
+              <a:t>Attitude Control Gains</a:t>
             </a:r>
           </a:p>
           <a:p>
             <a:pPr lvl="1"/>
             <a:r>
-              <a:rPr lang="en-US" dirty="0" smtClean="0"/>
-              <a:t>Roll and Pitch</a:t>
-            </a:r>
-          </a:p>
-          <a:p>
-            <a:r>
-              <a:rPr lang="en-US" dirty="0" smtClean="0"/>
-              <a:t>Data Plotter</a:t>
+              <a:rPr lang="en-AU" i="1" dirty="0" smtClean="0"/>
+              <a:t>Set the PID control gains on the roll, pitch and yaw control loops.</a:t>
+            </a:r>
+            <a:endParaRPr lang="en-AU" dirty="0" smtClean="0"/>
+          </a:p>
+          <a:p>
+            <a:pPr lvl="0"/>
+            <a:r>
+              <a:rPr lang="en-AU" dirty="0" smtClean="0"/>
+              <a:t>Guidance Control Gains</a:t>
             </a:r>
           </a:p>
           <a:p>
             <a:pPr lvl="1"/>
             <a:r>
-              <a:rPr lang="en-US" dirty="0" smtClean="0"/>
-              <a:t>Real-time data plotting</a:t>
+              <a:rPr lang="en-AU" i="1" dirty="0" smtClean="0"/>
+              <a:t>Set the PID control gains on the </a:t>
+            </a:r>
+            <a:r>
+              <a:rPr lang="en-AU" i="1" dirty="0" err="1" smtClean="0"/>
+              <a:t>x</a:t>
+            </a:r>
+            <a:r>
+              <a:rPr lang="en-AU" i="1" dirty="0" smtClean="0"/>
+              <a:t>, </a:t>
+            </a:r>
+            <a:r>
+              <a:rPr lang="en-AU" i="1" dirty="0" err="1" smtClean="0"/>
+              <a:t>y</a:t>
+            </a:r>
+            <a:r>
+              <a:rPr lang="en-AU" i="1" dirty="0" smtClean="0"/>
+              <a:t> and </a:t>
+            </a:r>
+            <a:r>
+              <a:rPr lang="en-AU" i="1" dirty="0" err="1" smtClean="0"/>
+              <a:t>z</a:t>
+            </a:r>
+            <a:r>
+              <a:rPr lang="en-AU" i="1" dirty="0" smtClean="0"/>
+              <a:t> position control loops.</a:t>
+            </a:r>
+            <a:endParaRPr lang="en-AU" dirty="0" smtClean="0"/>
+          </a:p>
+          <a:p>
+            <a:pPr lvl="0"/>
+            <a:r>
+              <a:rPr lang="en-AU" dirty="0" smtClean="0"/>
+              <a:t>Guidance Trims and Bounds</a:t>
             </a:r>
           </a:p>
           <a:p>
             <a:pPr lvl="1"/>
             <a:r>
-              <a:rPr lang="en-US" dirty="0" smtClean="0"/>
-              <a:t>Raw Sensor Data, State Data,</a:t>
-            </a:r>
-            <a:br>
-              <a:rPr lang="en-US" dirty="0" smtClean="0"/>
-            </a:br>
-            <a:r>
-              <a:rPr lang="en-US" dirty="0" smtClean="0"/>
-              <a:t> Control Data, System Status…</a:t>
+              <a:rPr lang="en-AU" i="1" dirty="0" smtClean="0"/>
+              <a:t>Set the trims and bounds of the </a:t>
+            </a:r>
+            <a:r>
+              <a:rPr lang="en-AU" i="1" dirty="0" err="1" smtClean="0"/>
+              <a:t>x</a:t>
+            </a:r>
+            <a:r>
+              <a:rPr lang="en-AU" i="1" dirty="0" smtClean="0"/>
+              <a:t>, </a:t>
+            </a:r>
+            <a:r>
+              <a:rPr lang="en-AU" i="1" dirty="0" err="1" smtClean="0"/>
+              <a:t>y</a:t>
+            </a:r>
+            <a:r>
+              <a:rPr lang="en-AU" i="1" dirty="0" smtClean="0"/>
+              <a:t> and </a:t>
+            </a:r>
+            <a:r>
+              <a:rPr lang="en-AU" i="1" dirty="0" err="1" smtClean="0"/>
+              <a:t>z</a:t>
+            </a:r>
+            <a:r>
+              <a:rPr lang="en-AU" i="1" dirty="0" smtClean="0"/>
+              <a:t> position control loops.</a:t>
+            </a:r>
+            <a:endParaRPr lang="en-AU" dirty="0" smtClean="0"/>
+          </a:p>
+          <a:p>
+            <a:r>
+              <a:rPr lang="en-AU" dirty="0" smtClean="0"/>
+              <a:t>Flight Control</a:t>
             </a:r>
           </a:p>
           <a:p>
             <a:pPr lvl="1"/>
             <a:r>
-              <a:rPr lang="en-US" dirty="0" smtClean="0"/>
-              <a:t>Support for multiple</a:t>
-            </a:r>
-            <a:br>
-              <a:rPr lang="en-US" dirty="0" smtClean="0"/>
-            </a:br>
-            <a:r>
-              <a:rPr lang="en-US" dirty="0" smtClean="0"/>
-              <a:t>data plotters</a:t>
-            </a:r>
-          </a:p>
-        </p:txBody>
-      </p:sp>
-      <p:pic>
-        <p:nvPicPr>
-          <p:cNvPr id="5" name="Picture 4" descr="GCS_Screenshot.png"/>
-          <p:cNvPicPr>
-            <a:picLocks noChangeAspect="1"/>
-          </p:cNvPicPr>
-          <p:nvPr/>
-        </p:nvPicPr>
-        <p:blipFill>
-          <a:blip r:embed="rId2"/>
-          <a:srcRect l="57031" t="4237" r="13459" b="27966"/>
-          <a:stretch>
-            <a:fillRect/>
-          </a:stretch>
-        </p:blipFill>
-        <p:spPr>
-          <a:xfrm>
-            <a:off x="5448300" y="3276600"/>
-            <a:ext cx="3695700" cy="3032369"/>
-          </a:xfrm>
-          <a:prstGeom prst="rect">
-            <a:avLst/>
-          </a:prstGeom>
-          <a:ln>
-            <a:noFill/>
-          </a:ln>
-          <a:effectLst>
-            <a:outerShdw blurRad="292100" dist="139700" dir="2700000" algn="tl" rotWithShape="0">
-              <a:srgbClr val="333333">
-                <a:alpha val="65000"/>
-              </a:srgbClr>
-            </a:outerShdw>
-          </a:effectLst>
-        </p:spPr>
-      </p:pic>
-      <p:pic>
-        <p:nvPicPr>
-          <p:cNvPr id="6" name="Picture 5" descr="GCS_Screenshot.png"/>
-          <p:cNvPicPr>
-            <a:picLocks noChangeAspect="1"/>
-          </p:cNvPicPr>
-          <p:nvPr/>
-        </p:nvPicPr>
-        <p:blipFill>
-          <a:blip r:embed="rId2"/>
-          <a:srcRect l="86759" t="4237" b="70339"/>
-          <a:stretch>
-            <a:fillRect/>
-          </a:stretch>
-        </p:blipFill>
-        <p:spPr>
-          <a:xfrm>
-            <a:off x="6477000" y="1371600"/>
-            <a:ext cx="2667000" cy="1828800"/>
-          </a:xfrm>
-          <a:prstGeom prst="rect">
-            <a:avLst/>
-          </a:prstGeom>
-          <a:ln>
-            <a:noFill/>
-          </a:ln>
-          <a:effectLst>
-            <a:outerShdw blurRad="292100" dist="139700" dir="2700000" algn="tl" rotWithShape="0">
-              <a:srgbClr val="333333">
-                <a:alpha val="65000"/>
-              </a:srgbClr>
-            </a:outerShdw>
-          </a:effectLst>
-        </p:spPr>
-      </p:pic>
-      <p:sp>
-        <p:nvSpPr>
-          <p:cNvPr id="7" name="Footer Placeholder 5"/>
-          <p:cNvSpPr>
-            <a:spLocks noGrp="1"/>
-          </p:cNvSpPr>
-          <p:nvPr>
-            <p:ph type="ftr" sz="quarter" idx="11"/>
-          </p:nvPr>
-        </p:nvSpPr>
-        <p:spPr>
-          <a:xfrm>
-            <a:off x="609600" y="6248206"/>
-            <a:ext cx="5421083" cy="365125"/>
-          </a:xfrm>
-        </p:spPr>
-        <p:txBody>
-          <a:bodyPr/>
-          <a:lstStyle/>
-          <a:p>
-            <a:r>
-              <a:rPr lang="en-AU" dirty="0" smtClean="0"/>
-              <a:t>Tim Molloy</a:t>
-            </a:r>
-            <a:endParaRPr lang="en-AU" dirty="0"/>
+              <a:rPr lang="en-AU" i="1" dirty="0" smtClean="0"/>
+              <a:t>Set the active control loops and their set points. Enables command of the airborne control.</a:t>
+            </a:r>
+            <a:endParaRPr lang="en-AU" dirty="0" smtClean="0"/>
           </a:p>
         </p:txBody>
       </p:sp>
@@ -12221,142 +12132,6 @@
   <p:clrMapOvr>
     <a:masterClrMapping/>
   </p:clrMapOvr>
-  <p:timing>
-    <p:tnLst>
-      <p:par>
-        <p:cTn id="1" dur="indefinite" restart="never" nodeType="tmRoot">
-          <p:childTnLst>
-            <p:seq concurrent="1" nextAc="seek">
-              <p:cTn id="2" dur="indefinite" nodeType="mainSeq">
-                <p:childTnLst>
-                  <p:par>
-                    <p:cTn id="3" fill="hold">
-                      <p:stCondLst>
-                        <p:cond delay="indefinite"/>
-                      </p:stCondLst>
-                      <p:childTnLst>
-                        <p:par>
-                          <p:cTn id="4" fill="hold">
-                            <p:stCondLst>
-                              <p:cond delay="0"/>
-                            </p:stCondLst>
-                            <p:childTnLst>
-                              <p:par>
-                                <p:cTn id="5" presetID="10" presetClass="entr" presetSubtype="0" fill="hold" nodeType="clickEffect">
-                                  <p:stCondLst>
-                                    <p:cond delay="0"/>
-                                  </p:stCondLst>
-                                  <p:childTnLst>
-                                    <p:set>
-                                      <p:cBhvr>
-                                        <p:cTn id="6" dur="1" fill="hold">
-                                          <p:stCondLst>
-                                            <p:cond delay="0"/>
-                                          </p:stCondLst>
-                                        </p:cTn>
-                                        <p:tgtEl>
-                                          <p:spTgt spid="5"/>
-                                        </p:tgtEl>
-                                        <p:attrNameLst>
-                                          <p:attrName>style.visibility</p:attrName>
-                                        </p:attrNameLst>
-                                      </p:cBhvr>
-                                      <p:to>
-                                        <p:strVal val="visible"/>
-                                      </p:to>
-                                    </p:set>
-                                    <p:animEffect transition="in" filter="fade">
-                                      <p:cBhvr>
-                                        <p:cTn id="7" dur="1000"/>
-                                        <p:tgtEl>
-                                          <p:spTgt spid="5"/>
-                                        </p:tgtEl>
-                                      </p:cBhvr>
-                                    </p:animEffect>
-                                  </p:childTnLst>
-                                </p:cTn>
-                              </p:par>
-                            </p:childTnLst>
-                          </p:cTn>
-                        </p:par>
-                      </p:childTnLst>
-                    </p:cTn>
-                  </p:par>
-                  <p:par>
-                    <p:cTn id="8" fill="hold">
-                      <p:stCondLst>
-                        <p:cond delay="indefinite"/>
-                      </p:stCondLst>
-                      <p:childTnLst>
-                        <p:par>
-                          <p:cTn id="9" fill="hold">
-                            <p:stCondLst>
-                              <p:cond delay="0"/>
-                            </p:stCondLst>
-                            <p:childTnLst>
-                              <p:par>
-                                <p:cTn id="10" presetID="10" presetClass="entr" presetSubtype="0" fill="hold" nodeType="clickEffect">
-                                  <p:stCondLst>
-                                    <p:cond delay="0"/>
-                                  </p:stCondLst>
-                                  <p:childTnLst>
-                                    <p:set>
-                                      <p:cBhvr>
-                                        <p:cTn id="11" dur="1" fill="hold">
-                                          <p:stCondLst>
-                                            <p:cond delay="0"/>
-                                          </p:stCondLst>
-                                        </p:cTn>
-                                        <p:tgtEl>
-                                          <p:spTgt spid="6"/>
-                                        </p:tgtEl>
-                                        <p:attrNameLst>
-                                          <p:attrName>style.visibility</p:attrName>
-                                        </p:attrNameLst>
-                                      </p:cBhvr>
-                                      <p:to>
-                                        <p:strVal val="visible"/>
-                                      </p:to>
-                                    </p:set>
-                                    <p:animEffect transition="in" filter="fade">
-                                      <p:cBhvr>
-                                        <p:cTn id="12" dur="1000"/>
-                                        <p:tgtEl>
-                                          <p:spTgt spid="6"/>
-                                        </p:tgtEl>
-                                      </p:cBhvr>
-                                    </p:animEffect>
-                                  </p:childTnLst>
-                                </p:cTn>
-                              </p:par>
-                            </p:childTnLst>
-                          </p:cTn>
-                        </p:par>
-                      </p:childTnLst>
-                    </p:cTn>
-                  </p:par>
-                </p:childTnLst>
-              </p:cTn>
-              <p:prevCondLst>
-                <p:cond evt="onPrev" delay="0">
-                  <p:tgtEl>
-                    <p:sldTgt/>
-                  </p:tgtEl>
-                </p:cond>
-              </p:prevCondLst>
-              <p:nextCondLst>
-                <p:cond evt="onNext" delay="0">
-                  <p:tgtEl>
-                    <p:sldTgt/>
-                  </p:tgtEl>
-                </p:cond>
-              </p:nextCondLst>
-            </p:seq>
-          </p:childTnLst>
-        </p:cTn>
-      </p:par>
-    </p:tnLst>
-  </p:timing>
 </p:sld>
 </file>
 
@@ -12389,16 +12164,14 @@
         </p:nvSpPr>
         <p:spPr/>
         <p:txBody>
-          <a:bodyPr>
-            <a:normAutofit/>
-          </a:bodyPr>
+          <a:bodyPr/>
           <a:lstStyle/>
           <a:p>
             <a:r>
-              <a:rPr lang="en-US" dirty="0" smtClean="0"/>
-              <a:t>Following Controller Design…</a:t>
-            </a:r>
-            <a:endParaRPr lang="en-US" dirty="0"/>
+              <a:rPr lang="en-AU" dirty="0" smtClean="0"/>
+              <a:t>Flight Control</a:t>
+            </a:r>
+            <a:endParaRPr lang="en-AU" dirty="0"/>
           </a:p>
         </p:txBody>
       </p:sp>
@@ -12423,220 +12196,6 @@
               <a:rPr lang="en-AU" smtClean="0"/>
               <a:pPr/>
               <a:t>12</a:t>
-            </a:fld>
-            <a:endParaRPr lang="en-AU"/>
-          </a:p>
-        </p:txBody>
-      </p:sp>
-      <p:sp>
-        <p:nvSpPr>
-          <p:cNvPr id="4" name="Content Placeholder 3"/>
-          <p:cNvSpPr>
-            <a:spLocks noGrp="1"/>
-          </p:cNvSpPr>
-          <p:nvPr>
-            <p:ph sz="quarter" idx="1"/>
-          </p:nvPr>
-        </p:nvSpPr>
-        <p:spPr/>
-        <p:txBody>
-          <a:bodyPr>
-            <a:normAutofit fontScale="85000" lnSpcReduction="20000"/>
-          </a:bodyPr>
-          <a:lstStyle/>
-          <a:p>
-            <a:pPr lvl="0"/>
-            <a:r>
-              <a:rPr lang="en-AU" dirty="0" smtClean="0"/>
-              <a:t>Attitude Control Trims and Bounds</a:t>
-            </a:r>
-          </a:p>
-          <a:p>
-            <a:pPr lvl="1"/>
-            <a:r>
-              <a:rPr lang="en-AU" i="1" dirty="0" smtClean="0"/>
-              <a:t>Set the trims and bounds on the roll, pitch and yaw control loops.</a:t>
-            </a:r>
-            <a:endParaRPr lang="en-AU" dirty="0" smtClean="0"/>
-          </a:p>
-          <a:p>
-            <a:pPr lvl="0"/>
-            <a:r>
-              <a:rPr lang="en-AU" dirty="0" smtClean="0"/>
-              <a:t>Attitude Control Gains</a:t>
-            </a:r>
-          </a:p>
-          <a:p>
-            <a:pPr lvl="1"/>
-            <a:r>
-              <a:rPr lang="en-AU" i="1" dirty="0" smtClean="0"/>
-              <a:t>Set the PID control gains on the roll, pitch and yaw control loops.</a:t>
-            </a:r>
-            <a:endParaRPr lang="en-AU" dirty="0" smtClean="0"/>
-          </a:p>
-          <a:p>
-            <a:pPr lvl="0"/>
-            <a:r>
-              <a:rPr lang="en-AU" dirty="0" smtClean="0"/>
-              <a:t>Guidance Control Gains</a:t>
-            </a:r>
-          </a:p>
-          <a:p>
-            <a:pPr lvl="1"/>
-            <a:r>
-              <a:rPr lang="en-AU" i="1" dirty="0" smtClean="0"/>
-              <a:t>Set the PID control gains on the </a:t>
-            </a:r>
-            <a:r>
-              <a:rPr lang="en-AU" i="1" dirty="0" err="1" smtClean="0"/>
-              <a:t>x</a:t>
-            </a:r>
-            <a:r>
-              <a:rPr lang="en-AU" i="1" dirty="0" smtClean="0"/>
-              <a:t>, </a:t>
-            </a:r>
-            <a:r>
-              <a:rPr lang="en-AU" i="1" dirty="0" err="1" smtClean="0"/>
-              <a:t>y</a:t>
-            </a:r>
-            <a:r>
-              <a:rPr lang="en-AU" i="1" dirty="0" smtClean="0"/>
-              <a:t> and </a:t>
-            </a:r>
-            <a:r>
-              <a:rPr lang="en-AU" i="1" dirty="0" err="1" smtClean="0"/>
-              <a:t>z</a:t>
-            </a:r>
-            <a:r>
-              <a:rPr lang="en-AU" i="1" dirty="0" smtClean="0"/>
-              <a:t> position control loops.</a:t>
-            </a:r>
-            <a:endParaRPr lang="en-AU" dirty="0" smtClean="0"/>
-          </a:p>
-          <a:p>
-            <a:pPr lvl="0"/>
-            <a:r>
-              <a:rPr lang="en-AU" dirty="0" smtClean="0"/>
-              <a:t>Guidance Trims and Bounds</a:t>
-            </a:r>
-          </a:p>
-          <a:p>
-            <a:pPr lvl="1"/>
-            <a:r>
-              <a:rPr lang="en-AU" i="1" dirty="0" smtClean="0"/>
-              <a:t>Set the trims and bounds of the </a:t>
-            </a:r>
-            <a:r>
-              <a:rPr lang="en-AU" i="1" dirty="0" err="1" smtClean="0"/>
-              <a:t>x</a:t>
-            </a:r>
-            <a:r>
-              <a:rPr lang="en-AU" i="1" dirty="0" smtClean="0"/>
-              <a:t>, </a:t>
-            </a:r>
-            <a:r>
-              <a:rPr lang="en-AU" i="1" dirty="0" err="1" smtClean="0"/>
-              <a:t>y</a:t>
-            </a:r>
-            <a:r>
-              <a:rPr lang="en-AU" i="1" dirty="0" smtClean="0"/>
-              <a:t> and </a:t>
-            </a:r>
-            <a:r>
-              <a:rPr lang="en-AU" i="1" dirty="0" err="1" smtClean="0"/>
-              <a:t>z</a:t>
-            </a:r>
-            <a:r>
-              <a:rPr lang="en-AU" i="1" dirty="0" smtClean="0"/>
-              <a:t> position control loops.</a:t>
-            </a:r>
-            <a:endParaRPr lang="en-AU" dirty="0" smtClean="0"/>
-          </a:p>
-          <a:p>
-            <a:r>
-              <a:rPr lang="en-AU" dirty="0" smtClean="0"/>
-              <a:t>Flight Control</a:t>
-            </a:r>
-          </a:p>
-          <a:p>
-            <a:pPr lvl="1"/>
-            <a:r>
-              <a:rPr lang="en-AU" i="1" dirty="0" smtClean="0"/>
-              <a:t>Set the active control loops and their set points. Enables command of the airborne control.</a:t>
-            </a:r>
-            <a:endParaRPr lang="en-AU" dirty="0" smtClean="0"/>
-          </a:p>
-        </p:txBody>
-      </p:sp>
-    </p:spTree>
-  </p:cSld>
-  <p:clrMapOvr>
-    <a:masterClrMapping/>
-  </p:clrMapOvr>
-</p:sld>
-</file>
-
-<file path=ppt/slides/slide13.xml><?xml version="1.0" encoding="utf-8"?>
-<p:sld xmlns:a="http://schemas.openxmlformats.org/drawingml/2006/main" xmlns:r="http://schemas.openxmlformats.org/officeDocument/2006/relationships" xmlns:mc="http://schemas.openxmlformats.org/markup-compatibility/2006" xmlns:mv="urn:schemas-microsoft-com:mac:vml" xmlns:p="http://schemas.openxmlformats.org/presentationml/2006/main" mc:Ignorable="mv" mc:PreserveAttributes="mv:*">
-  <p:cSld>
-    <p:spTree>
-      <p:nvGrpSpPr>
-        <p:cNvPr id="1" name=""/>
-        <p:cNvGrpSpPr/>
-        <p:nvPr/>
-      </p:nvGrpSpPr>
-      <p:grpSpPr>
-        <a:xfrm>
-          <a:off x="0" y="0"/>
-          <a:ext cx="0" cy="0"/>
-          <a:chOff x="0" y="0"/>
-          <a:chExt cx="0" cy="0"/>
-        </a:xfrm>
-      </p:grpSpPr>
-      <p:sp>
-        <p:nvSpPr>
-          <p:cNvPr id="2" name="Title 1"/>
-          <p:cNvSpPr>
-            <a:spLocks noGrp="1"/>
-          </p:cNvSpPr>
-          <p:nvPr>
-            <p:ph type="title"/>
-          </p:nvPr>
-        </p:nvSpPr>
-        <p:spPr/>
-        <p:txBody>
-          <a:bodyPr/>
-          <a:lstStyle/>
-          <a:p>
-            <a:r>
-              <a:rPr lang="en-AU" dirty="0" smtClean="0"/>
-              <a:t>Flight Control</a:t>
-            </a:r>
-            <a:endParaRPr lang="en-AU" dirty="0"/>
-          </a:p>
-        </p:txBody>
-      </p:sp>
-      <p:sp>
-        <p:nvSpPr>
-          <p:cNvPr id="3" name="Slide Number Placeholder 2"/>
-          <p:cNvSpPr>
-            <a:spLocks noGrp="1"/>
-          </p:cNvSpPr>
-          <p:nvPr>
-            <p:ph type="sldNum" sz="quarter" idx="12"/>
-          </p:nvPr>
-        </p:nvSpPr>
-        <p:spPr/>
-        <p:txBody>
-          <a:bodyPr>
-            <a:normAutofit fontScale="85000" lnSpcReduction="20000"/>
-          </a:bodyPr>
-          <a:lstStyle/>
-          <a:p>
-            <a:fld id="{5AEDDE57-BFB4-403C-8AD6-39A9EF93D28E}" type="slidenum">
-              <a:rPr lang="en-AU" smtClean="0"/>
-              <a:pPr/>
-              <a:t>13</a:t>
             </a:fld>
             <a:endParaRPr lang="en-AU" dirty="0"/>
           </a:p>
@@ -13907,7 +13466,7 @@
 </p:sld>
 </file>
 
-<file path=ppt/slides/slide14.xml><?xml version="1.0" encoding="utf-8"?>
+<file path=ppt/slides/slide13.xml><?xml version="1.0" encoding="utf-8"?>
 <p:sld xmlns:a="http://schemas.openxmlformats.org/drawingml/2006/main" xmlns:r="http://schemas.openxmlformats.org/officeDocument/2006/relationships" xmlns:mc="http://schemas.openxmlformats.org/markup-compatibility/2006" xmlns:mv="urn:schemas-microsoft-com:mac:vml" xmlns:p="http://schemas.openxmlformats.org/presentationml/2006/main" mc:Ignorable="mv" mc:PreserveAttributes="mv:*">
   <p:cSld>
     <p:spTree>
@@ -13967,7 +13526,7 @@
             <a:fld id="{5AEDDE57-BFB4-403C-8AD6-39A9EF93D28E}" type="slidenum">
               <a:rPr lang="en-AU" smtClean="0"/>
               <a:pPr/>
-              <a:t>14</a:t>
+              <a:t>13</a:t>
             </a:fld>
             <a:endParaRPr lang="en-AU"/>
           </a:p>
@@ -14192,6 +13751,402 @@
 </p:sld>
 </file>
 
+<file path=ppt/slides/slide14.xml><?xml version="1.0" encoding="utf-8"?>
+<p:sld xmlns:a="http://schemas.openxmlformats.org/drawingml/2006/main" xmlns:r="http://schemas.openxmlformats.org/officeDocument/2006/relationships" xmlns:mc="http://schemas.openxmlformats.org/markup-compatibility/2006" xmlns:mv="urn:schemas-microsoft-com:mac:vml" xmlns:p="http://schemas.openxmlformats.org/presentationml/2006/main" mc:Ignorable="mv" mc:PreserveAttributes="mv:*">
+  <p:cSld>
+    <p:spTree>
+      <p:nvGrpSpPr>
+        <p:cNvPr id="1" name=""/>
+        <p:cNvGrpSpPr/>
+        <p:nvPr/>
+      </p:nvGrpSpPr>
+      <p:grpSpPr>
+        <a:xfrm>
+          <a:off x="0" y="0"/>
+          <a:ext cx="0" cy="0"/>
+          <a:chOff x="0" y="0"/>
+          <a:chExt cx="0" cy="0"/>
+        </a:xfrm>
+      </p:grpSpPr>
+      <p:sp>
+        <p:nvSpPr>
+          <p:cNvPr id="2" name="Title 1"/>
+          <p:cNvSpPr>
+            <a:spLocks noGrp="1"/>
+          </p:cNvSpPr>
+          <p:nvPr>
+            <p:ph type="title"/>
+          </p:nvPr>
+        </p:nvSpPr>
+        <p:spPr/>
+        <p:txBody>
+          <a:bodyPr/>
+          <a:lstStyle/>
+          <a:p>
+            <a:r>
+              <a:rPr lang="en-US" dirty="0" err="1" smtClean="0"/>
+              <a:t>Quadrotor</a:t>
+            </a:r>
+            <a:r>
+              <a:rPr lang="en-US" dirty="0" smtClean="0"/>
+              <a:t> Control</a:t>
+            </a:r>
+            <a:endParaRPr lang="en-US" dirty="0"/>
+          </a:p>
+        </p:txBody>
+      </p:sp>
+      <p:sp>
+        <p:nvSpPr>
+          <p:cNvPr id="3" name="Slide Number Placeholder 2"/>
+          <p:cNvSpPr>
+            <a:spLocks noGrp="1"/>
+          </p:cNvSpPr>
+          <p:nvPr>
+            <p:ph type="sldNum" sz="quarter" idx="12"/>
+          </p:nvPr>
+        </p:nvSpPr>
+        <p:spPr/>
+        <p:txBody>
+          <a:bodyPr>
+            <a:normAutofit fontScale="85000" lnSpcReduction="20000"/>
+          </a:bodyPr>
+          <a:lstStyle/>
+          <a:p>
+            <a:fld id="{5AEDDE57-BFB4-403C-8AD6-39A9EF93D28E}" type="slidenum">
+              <a:rPr lang="en-AU" smtClean="0"/>
+              <a:pPr/>
+              <a:t>14</a:t>
+            </a:fld>
+            <a:endParaRPr lang="en-AU"/>
+          </a:p>
+        </p:txBody>
+      </p:sp>
+      <p:sp>
+        <p:nvSpPr>
+          <p:cNvPr id="4" name="Content Placeholder 3"/>
+          <p:cNvSpPr>
+            <a:spLocks noGrp="1"/>
+          </p:cNvSpPr>
+          <p:nvPr>
+            <p:ph sz="quarter" idx="1"/>
+          </p:nvPr>
+        </p:nvSpPr>
+        <p:spPr>
+          <a:xfrm>
+            <a:off x="609600" y="1600200"/>
+            <a:ext cx="8153400" cy="4572000"/>
+          </a:xfrm>
+        </p:spPr>
+        <p:txBody>
+          <a:bodyPr>
+            <a:normAutofit/>
+          </a:bodyPr>
+          <a:lstStyle/>
+          <a:p>
+            <a:r>
+              <a:rPr lang="en-US" dirty="0" smtClean="0"/>
+              <a:t>Thrust Altitude Control Forces</a:t>
+            </a:r>
+            <a:br>
+              <a:rPr lang="en-US" dirty="0" smtClean="0"/>
+            </a:br>
+            <a:endParaRPr lang="en-US" dirty="0" smtClean="0"/>
+          </a:p>
+          <a:p>
+            <a:r>
+              <a:rPr lang="en-US" dirty="0" smtClean="0"/>
+              <a:t>Thrust Roll Control Forces</a:t>
+            </a:r>
+            <a:br>
+              <a:rPr lang="en-US" dirty="0" smtClean="0"/>
+            </a:br>
+            <a:endParaRPr lang="en-US" dirty="0" smtClean="0"/>
+          </a:p>
+          <a:p>
+            <a:r>
+              <a:rPr lang="en-US" dirty="0" smtClean="0"/>
+              <a:t>Thrust Pitch Control Forces</a:t>
+            </a:r>
+            <a:br>
+              <a:rPr lang="en-US" dirty="0" smtClean="0"/>
+            </a:br>
+            <a:endParaRPr lang="en-US" dirty="0" smtClean="0"/>
+          </a:p>
+          <a:p>
+            <a:r>
+              <a:rPr lang="en-US" dirty="0" smtClean="0"/>
+              <a:t>Drag Yaw Control Forces </a:t>
+            </a:r>
+          </a:p>
+          <a:p>
+            <a:pPr>
+              <a:buNone/>
+            </a:pPr>
+            <a:r>
+              <a:rPr lang="en-US" dirty="0" smtClean="0"/>
+              <a:t/>
+            </a:r>
+            <a:br>
+              <a:rPr lang="en-US" dirty="0" smtClean="0"/>
+            </a:br>
+            <a:endParaRPr lang="en-US" dirty="0" smtClean="0"/>
+          </a:p>
+          <a:p>
+            <a:endParaRPr lang="en-US" dirty="0" smtClean="0"/>
+          </a:p>
+        </p:txBody>
+      </p:sp>
+      <p:sp>
+        <p:nvSpPr>
+          <p:cNvPr id="5" name="Footer Placeholder 5"/>
+          <p:cNvSpPr>
+            <a:spLocks noGrp="1"/>
+          </p:cNvSpPr>
+          <p:nvPr>
+            <p:ph type="ftr" sz="quarter" idx="11"/>
+          </p:nvPr>
+        </p:nvSpPr>
+        <p:spPr>
+          <a:xfrm>
+            <a:off x="609600" y="6248206"/>
+            <a:ext cx="5421083" cy="365125"/>
+          </a:xfrm>
+        </p:spPr>
+        <p:txBody>
+          <a:bodyPr/>
+          <a:lstStyle/>
+          <a:p>
+            <a:r>
+              <a:rPr lang="en-AU" dirty="0" smtClean="0"/>
+              <a:t>Tim Molloy</a:t>
+            </a:r>
+            <a:endParaRPr lang="en-AU" dirty="0"/>
+          </a:p>
+        </p:txBody>
+      </p:sp>
+      <p:graphicFrame>
+        <p:nvGraphicFramePr>
+          <p:cNvPr id="7" name="Object 6"/>
+          <p:cNvGraphicFramePr>
+            <a:graphicFrameLocks noChangeAspect="1"/>
+          </p:cNvGraphicFramePr>
+          <p:nvPr/>
+        </p:nvGraphicFramePr>
+        <p:xfrm>
+          <a:off x="2362200" y="2286000"/>
+          <a:ext cx="2914650" cy="357188"/>
+        </p:xfrm>
+        <a:graphic>
+          <a:graphicData uri="http://schemas.openxmlformats.org/presentationml/2006/ole">
+            <p:oleObj spid="_x0000_s20482" name="Equation" r:id="rId3" imgW="1447800" imgH="177800" progId="Equation.3">
+              <p:embed/>
+            </p:oleObj>
+          </a:graphicData>
+        </a:graphic>
+      </p:graphicFrame>
+      <p:graphicFrame>
+        <p:nvGraphicFramePr>
+          <p:cNvPr id="20483" name="Object 3"/>
+          <p:cNvGraphicFramePr>
+            <a:graphicFrameLocks noChangeAspect="1"/>
+          </p:cNvGraphicFramePr>
+          <p:nvPr/>
+        </p:nvGraphicFramePr>
+        <p:xfrm>
+          <a:off x="2362200" y="3200400"/>
+          <a:ext cx="1687508" cy="357187"/>
+        </p:xfrm>
+        <a:graphic>
+          <a:graphicData uri="http://schemas.openxmlformats.org/presentationml/2006/ole">
+            <p:oleObj spid="_x0000_s20483" name="Equation" r:id="rId4" imgW="838200" imgH="177800" progId="Equation.3">
+              <p:embed/>
+            </p:oleObj>
+          </a:graphicData>
+        </a:graphic>
+      </p:graphicFrame>
+      <p:graphicFrame>
+        <p:nvGraphicFramePr>
+          <p:cNvPr id="20484" name="Object 4"/>
+          <p:cNvGraphicFramePr>
+            <a:graphicFrameLocks noChangeAspect="1"/>
+          </p:cNvGraphicFramePr>
+          <p:nvPr/>
+        </p:nvGraphicFramePr>
+        <p:xfrm>
+          <a:off x="2362200" y="4191000"/>
+          <a:ext cx="1560513" cy="371689"/>
+        </p:xfrm>
+        <a:graphic>
+          <a:graphicData uri="http://schemas.openxmlformats.org/presentationml/2006/ole">
+            <p:oleObj spid="_x0000_s20484" name="Equation" r:id="rId5" imgW="850900" imgH="203200" progId="Equation.3">
+              <p:embed/>
+            </p:oleObj>
+          </a:graphicData>
+        </a:graphic>
+      </p:graphicFrame>
+      <p:graphicFrame>
+        <p:nvGraphicFramePr>
+          <p:cNvPr id="20485" name="Object 5"/>
+          <p:cNvGraphicFramePr>
+            <a:graphicFrameLocks noChangeAspect="1"/>
+          </p:cNvGraphicFramePr>
+          <p:nvPr/>
+        </p:nvGraphicFramePr>
+        <p:xfrm>
+          <a:off x="2286000" y="5105400"/>
+          <a:ext cx="3221804" cy="412186"/>
+        </p:xfrm>
+        <a:graphic>
+          <a:graphicData uri="http://schemas.openxmlformats.org/presentationml/2006/ole">
+            <p:oleObj spid="_x0000_s20485" name="Equation" r:id="rId6" imgW="1879600" imgH="241300" progId="Equation.3">
+              <p:embed/>
+            </p:oleObj>
+          </a:graphicData>
+        </a:graphic>
+      </p:graphicFrame>
+      <p:pic>
+        <p:nvPicPr>
+          <p:cNvPr id="12" name="Picture 11"/>
+          <p:cNvPicPr>
+            <a:picLocks noChangeAspect="1"/>
+          </p:cNvPicPr>
+          <p:nvPr/>
+        </p:nvPicPr>
+        <p:blipFill>
+          <a:blip r:embed="rId7" cstate="print"/>
+          <a:srcRect l="9749" t="48142" r="49802" b="4124"/>
+          <a:stretch>
+            <a:fillRect/>
+          </a:stretch>
+        </p:blipFill>
+        <p:spPr bwMode="auto">
+          <a:xfrm>
+            <a:off x="6019800" y="1600200"/>
+            <a:ext cx="1524000" cy="1828800"/>
+          </a:xfrm>
+          <a:prstGeom prst="rect">
+            <a:avLst/>
+          </a:prstGeom>
+          <a:noFill/>
+          <a:ln w="9525">
+            <a:noFill/>
+            <a:miter lim="800000"/>
+            <a:headEnd/>
+            <a:tailEnd/>
+          </a:ln>
+        </p:spPr>
+      </p:pic>
+      <p:pic>
+        <p:nvPicPr>
+          <p:cNvPr id="13" name="Picture 12"/>
+          <p:cNvPicPr>
+            <a:picLocks noChangeAspect="1"/>
+          </p:cNvPicPr>
+          <p:nvPr/>
+        </p:nvPicPr>
+        <p:blipFill>
+          <a:blip r:embed="rId7" cstate="print"/>
+          <a:srcRect l="52220" t="50131" r="4945" b="4124"/>
+          <a:stretch>
+            <a:fillRect/>
+          </a:stretch>
+        </p:blipFill>
+        <p:spPr bwMode="auto">
+          <a:xfrm>
+            <a:off x="7530123" y="1676400"/>
+            <a:ext cx="1613877" cy="1752600"/>
+          </a:xfrm>
+          <a:prstGeom prst="rect">
+            <a:avLst/>
+          </a:prstGeom>
+          <a:noFill/>
+          <a:ln w="9525">
+            <a:noFill/>
+            <a:miter lim="800000"/>
+            <a:headEnd/>
+            <a:tailEnd/>
+          </a:ln>
+        </p:spPr>
+      </p:pic>
+      <p:pic>
+        <p:nvPicPr>
+          <p:cNvPr id="14" name="Picture 13"/>
+          <p:cNvPicPr>
+            <a:picLocks noChangeAspect="1"/>
+          </p:cNvPicPr>
+          <p:nvPr/>
+        </p:nvPicPr>
+        <p:blipFill>
+          <a:blip r:embed="rId7" cstate="print"/>
+          <a:srcRect l="50561" t="2397" r="4945" b="49869"/>
+          <a:stretch>
+            <a:fillRect/>
+          </a:stretch>
+        </p:blipFill>
+        <p:spPr bwMode="auto">
+          <a:xfrm>
+            <a:off x="7467600" y="3657600"/>
+            <a:ext cx="1676400" cy="1828800"/>
+          </a:xfrm>
+          <a:prstGeom prst="rect">
+            <a:avLst/>
+          </a:prstGeom>
+          <a:noFill/>
+          <a:ln w="9525">
+            <a:noFill/>
+            <a:miter lim="800000"/>
+            <a:headEnd/>
+            <a:tailEnd/>
+          </a:ln>
+        </p:spPr>
+      </p:pic>
+      <p:pic>
+        <p:nvPicPr>
+          <p:cNvPr id="15" name="Picture 14"/>
+          <p:cNvPicPr>
+            <a:picLocks noChangeAspect="1"/>
+          </p:cNvPicPr>
+          <p:nvPr/>
+        </p:nvPicPr>
+        <p:blipFill>
+          <a:blip r:embed="rId7" cstate="print"/>
+          <a:srcRect l="9749" t="2397" r="47779" b="49869"/>
+          <a:stretch>
+            <a:fillRect/>
+          </a:stretch>
+        </p:blipFill>
+        <p:spPr bwMode="auto">
+          <a:xfrm>
+            <a:off x="5943600" y="3657600"/>
+            <a:ext cx="1600200" cy="1828800"/>
+          </a:xfrm>
+          <a:prstGeom prst="rect">
+            <a:avLst/>
+          </a:prstGeom>
+          <a:noFill/>
+          <a:ln w="9525">
+            <a:noFill/>
+            <a:miter lim="800000"/>
+            <a:headEnd/>
+            <a:tailEnd/>
+          </a:ln>
+        </p:spPr>
+      </p:pic>
+    </p:spTree>
+  </p:cSld>
+  <p:clrMapOvr>
+    <a:masterClrMapping/>
+  </p:clrMapOvr>
+  <p:timing>
+    <p:tnLst>
+      <p:par>
+        <p:cTn id="1" dur="indefinite" restart="never" nodeType="tmRoot"/>
+      </p:par>
+    </p:tnLst>
+  </p:timing>
+</p:sld>
+</file>
+
 <file path=ppt/slides/slide15.xml><?xml version="1.0" encoding="utf-8"?>
 <p:sld xmlns:a="http://schemas.openxmlformats.org/drawingml/2006/main" xmlns:r="http://schemas.openxmlformats.org/officeDocument/2006/relationships" xmlns:mc="http://schemas.openxmlformats.org/markup-compatibility/2006" xmlns:mv="urn:schemas-microsoft-com:mac:vml" xmlns:p="http://schemas.openxmlformats.org/presentationml/2006/main" mc:Ignorable="mv" mc:PreserveAttributes="mv:*">
   <p:cSld>
@@ -14264,93 +14219,6 @@
       </p:sp>
       <p:sp>
         <p:nvSpPr>
-          <p:cNvPr id="4" name="Content Placeholder 3"/>
-          <p:cNvSpPr>
-            <a:spLocks noGrp="1"/>
-          </p:cNvSpPr>
-          <p:nvPr>
-            <p:ph sz="quarter" idx="1"/>
-          </p:nvPr>
-        </p:nvSpPr>
-        <p:spPr>
-          <a:xfrm>
-            <a:off x="609600" y="1600200"/>
-            <a:ext cx="8153400" cy="3429000"/>
-          </a:xfrm>
-        </p:spPr>
-        <p:txBody>
-          <a:bodyPr>
-            <a:normAutofit fontScale="77500" lnSpcReduction="20000"/>
-          </a:bodyPr>
-          <a:lstStyle/>
-          <a:p>
-            <a:r>
-              <a:rPr lang="en-US" dirty="0" smtClean="0"/>
-              <a:t>Thrust Altitude Control Forces</a:t>
-            </a:r>
-            <a:r>
-              <a:rPr lang="en-US" dirty="0" smtClean="0"/>
-              <a:t/>
-            </a:r>
-            <a:br>
-              <a:rPr lang="en-US" dirty="0" smtClean="0"/>
-            </a:br>
-            <a:endParaRPr lang="en-US" dirty="0" smtClean="0"/>
-          </a:p>
-          <a:p>
-            <a:r>
-              <a:rPr lang="en-US" dirty="0" smtClean="0"/>
-              <a:t>Thrust Roll </a:t>
-            </a:r>
-            <a:r>
-              <a:rPr lang="en-US" dirty="0" smtClean="0"/>
-              <a:t>Control Forces</a:t>
-            </a:r>
-            <a:br>
-              <a:rPr lang="en-US" dirty="0" smtClean="0"/>
-            </a:br>
-            <a:endParaRPr lang="en-US" dirty="0" smtClean="0"/>
-          </a:p>
-          <a:p>
-            <a:r>
-              <a:rPr lang="en-US" dirty="0" smtClean="0"/>
-              <a:t>Thrust Pitch C</a:t>
-            </a:r>
-            <a:r>
-              <a:rPr lang="en-US" dirty="0" smtClean="0"/>
-              <a:t>ontrol Forces</a:t>
-            </a:r>
-            <a:br>
-              <a:rPr lang="en-US" dirty="0" smtClean="0"/>
-            </a:br>
-            <a:endParaRPr lang="en-US" dirty="0" smtClean="0"/>
-          </a:p>
-          <a:p>
-            <a:r>
-              <a:rPr lang="en-US" dirty="0" smtClean="0"/>
-              <a:t>Drag Yaw Control Forces </a:t>
-            </a:r>
-          </a:p>
-          <a:p>
-            <a:endParaRPr lang="en-US" dirty="0" smtClean="0"/>
-          </a:p>
-          <a:p>
-            <a:r>
-              <a:rPr lang="en-US" dirty="0" smtClean="0"/>
-              <a:t>Motor Output Signals</a:t>
-            </a:r>
-            <a:br>
-              <a:rPr lang="en-US" dirty="0" smtClean="0"/>
-            </a:br>
-            <a:endParaRPr lang="en-US" dirty="0" smtClean="0"/>
-          </a:p>
-          <a:p>
-            <a:endParaRPr lang="en-US" dirty="0" smtClean="0"/>
-          </a:p>
-        </p:txBody>
-      </p:sp>
-      <p:sp>
-        <p:nvSpPr>
           <p:cNvPr id="5" name="Footer Placeholder 5"/>
           <p:cNvSpPr>
             <a:spLocks noGrp="1"/>
@@ -14370,138 +14238,87 @@
           <a:lstStyle/>
           <a:p>
             <a:r>
-              <a:rPr lang="en-AU" dirty="0" smtClean="0"/>
+              <a:rPr lang="en-AU" smtClean="0"/>
               <a:t>Tim Molloy</a:t>
             </a:r>
             <a:endParaRPr lang="en-AU" dirty="0"/>
           </a:p>
         </p:txBody>
       </p:sp>
-      <p:pic>
-        <p:nvPicPr>
-          <p:cNvPr id="6" name="Picture 5"/>
-          <p:cNvPicPr/>
-          <p:nvPr/>
-        </p:nvPicPr>
-        <p:blipFill>
-          <a:blip r:embed="rId3" cstate="print"/>
-          <a:srcRect l="9749" t="2397" r="4945" b="4124"/>
-          <a:stretch>
-            <a:fillRect/>
-          </a:stretch>
-        </p:blipFill>
-        <p:spPr bwMode="auto">
+      <p:sp>
+        <p:nvSpPr>
+          <p:cNvPr id="7" name="Content Placeholder 6"/>
+          <p:cNvSpPr>
+            <a:spLocks noGrp="1"/>
+          </p:cNvSpPr>
+          <p:nvPr>
+            <p:ph sz="quarter" idx="1"/>
+          </p:nvPr>
+        </p:nvSpPr>
+        <p:spPr>
           <a:xfrm>
-            <a:off x="6248400" y="1600200"/>
-            <a:ext cx="2667000" cy="2971800"/>
+            <a:off x="612648" y="1600200"/>
+            <a:ext cx="8153400" cy="4800600"/>
           </a:xfrm>
-          <a:prstGeom prst="rect">
-            <a:avLst/>
-          </a:prstGeom>
-          <a:noFill/>
-          <a:ln w="9525">
-            <a:noFill/>
-            <a:miter lim="800000"/>
-            <a:headEnd/>
-            <a:tailEnd/>
-          </a:ln>
         </p:spPr>
-      </p:pic>
+        <p:txBody>
+          <a:bodyPr>
+            <a:normAutofit fontScale="92500" lnSpcReduction="20000"/>
+          </a:bodyPr>
+          <a:lstStyle/>
+          <a:p>
+            <a:r>
+              <a:rPr lang="en-US" dirty="0" smtClean="0"/>
+              <a:t>Drag and Thrust forces are proportional to the square of the engine speeds which are in turn proportional to the motor control signals</a:t>
+            </a:r>
+            <a:r>
+              <a:rPr lang="en-US" dirty="0" smtClean="0"/>
+              <a:t>:</a:t>
+            </a:r>
+          </a:p>
+          <a:p>
+            <a:endParaRPr lang="en-US" dirty="0" smtClean="0"/>
+          </a:p>
+          <a:p>
+            <a:endParaRPr lang="en-US" dirty="0" smtClean="0"/>
+          </a:p>
+          <a:p>
+            <a:endParaRPr lang="en-US" dirty="0" smtClean="0"/>
+          </a:p>
+          <a:p>
+            <a:endParaRPr lang="en-US" dirty="0" smtClean="0"/>
+          </a:p>
+          <a:p>
+            <a:endParaRPr lang="en-US" dirty="0" smtClean="0"/>
+          </a:p>
+          <a:p>
+            <a:r>
+              <a:rPr lang="en-US" dirty="0" smtClean="0"/>
+              <a:t>This is the mixing relationship between the altitude, roll, pitch or yaw controller output</a:t>
+            </a:r>
+            <a:r>
+              <a:rPr lang="en-US" dirty="0" smtClean="0"/>
+              <a:t>s and the individual motor control signals.</a:t>
+            </a:r>
+            <a:endParaRPr lang="en-US" dirty="0" smtClean="0"/>
+          </a:p>
+        </p:txBody>
+      </p:sp>
       <p:graphicFrame>
         <p:nvGraphicFramePr>
-          <p:cNvPr id="7" name="Object 6"/>
+          <p:cNvPr id="34818" name="Content Placeholder 5"/>
           <p:cNvGraphicFramePr>
             <a:graphicFrameLocks noChangeAspect="1"/>
           </p:cNvGraphicFramePr>
           <p:nvPr/>
         </p:nvGraphicFramePr>
         <p:xfrm>
-          <a:off x="2362200" y="1981200"/>
-          <a:ext cx="2914650" cy="357188"/>
-        </p:xfrm>
-        <a:graphic>
-          <a:graphicData uri="http://schemas.openxmlformats.org/presentationml/2006/ole">
-            <p:oleObj spid="_x0000_s20482" name="Equation" r:id="rId4" imgW="1447800" imgH="177800" progId="Equation.3">
-              <p:embed/>
-            </p:oleObj>
-          </a:graphicData>
-        </a:graphic>
-      </p:graphicFrame>
-      <p:graphicFrame>
-        <p:nvGraphicFramePr>
-          <p:cNvPr id="20483" name="Object 3"/>
-          <p:cNvGraphicFramePr>
-            <a:graphicFrameLocks noChangeAspect="1"/>
-          </p:cNvGraphicFramePr>
-          <p:nvPr/>
-        </p:nvGraphicFramePr>
-        <p:xfrm>
-          <a:off x="2362199" y="2667000"/>
-          <a:ext cx="1687508" cy="357187"/>
-        </p:xfrm>
-        <a:graphic>
-          <a:graphicData uri="http://schemas.openxmlformats.org/presentationml/2006/ole">
-            <p:oleObj spid="_x0000_s20483" name="Equation" r:id="rId5" imgW="838200" imgH="177800" progId="Equation.3">
-              <p:embed/>
-            </p:oleObj>
-          </a:graphicData>
-        </a:graphic>
-      </p:graphicFrame>
-      <p:graphicFrame>
-        <p:nvGraphicFramePr>
-          <p:cNvPr id="20484" name="Object 4"/>
-          <p:cNvGraphicFramePr>
-            <a:graphicFrameLocks noChangeAspect="1"/>
-          </p:cNvGraphicFramePr>
-          <p:nvPr/>
-        </p:nvGraphicFramePr>
-        <p:xfrm>
-          <a:off x="2362200" y="3276600"/>
-          <a:ext cx="1560513" cy="371689"/>
-        </p:xfrm>
-        <a:graphic>
-          <a:graphicData uri="http://schemas.openxmlformats.org/presentationml/2006/ole">
-            <p:oleObj spid="_x0000_s20484" name="Equation" r:id="rId6" imgW="850900" imgH="203200" progId="Equation.3">
-              <p:embed/>
-            </p:oleObj>
-          </a:graphicData>
-        </a:graphic>
-      </p:graphicFrame>
-      <p:graphicFrame>
-        <p:nvGraphicFramePr>
-          <p:cNvPr id="20485" name="Object 5"/>
-          <p:cNvGraphicFramePr>
-            <a:graphicFrameLocks noChangeAspect="1"/>
-          </p:cNvGraphicFramePr>
-          <p:nvPr/>
-        </p:nvGraphicFramePr>
-        <p:xfrm>
-          <a:off x="2362200" y="3962401"/>
-          <a:ext cx="3221804" cy="412186"/>
-        </p:xfrm>
-        <a:graphic>
-          <a:graphicData uri="http://schemas.openxmlformats.org/presentationml/2006/ole">
-            <p:oleObj spid="_x0000_s20485" name="Equation" r:id="rId7" imgW="1879600" imgH="241300" progId="Equation.3">
-              <p:embed/>
-            </p:oleObj>
-          </a:graphicData>
-        </a:graphic>
-      </p:graphicFrame>
-      <p:graphicFrame>
-        <p:nvGraphicFramePr>
-          <p:cNvPr id="20486" name="Content Placeholder 5"/>
-          <p:cNvGraphicFramePr>
-            <a:graphicFrameLocks noChangeAspect="1"/>
-          </p:cNvGraphicFramePr>
-          <p:nvPr/>
-        </p:nvGraphicFramePr>
-        <p:xfrm>
-          <a:off x="936625" y="4800600"/>
+          <a:off x="2362200" y="2819400"/>
           <a:ext cx="4229100" cy="1905000"/>
         </p:xfrm>
         <a:graphic>
           <a:graphicData uri="http://schemas.openxmlformats.org/presentationml/2006/ole">
-            <p:oleObj spid="_x0000_s20486" name="Equation" r:id="rId8" imgW="2057400" imgH="927100" progId="Equation.3">
+            <p:oleObj spid="_x0000_s34818" name="Equation" r:id="rId3" imgW="2057400" imgH="927100" progId="Equation.3">
               <p:embed/>
             </p:oleObj>
           </a:graphicData>
@@ -14555,8 +14372,12 @@
           <a:lstStyle/>
           <a:p>
             <a:r>
+              <a:rPr lang="en-US" dirty="0" err="1" smtClean="0"/>
+              <a:t>Quadrotor</a:t>
+            </a:r>
+            <a:r>
               <a:rPr lang="en-US" dirty="0" smtClean="0"/>
-              <a:t>Attitude Control</a:t>
+              <a:t> Control</a:t>
             </a:r>
             <a:endParaRPr lang="en-US" dirty="0"/>
           </a:p>
@@ -14631,10 +14452,76 @@
           <a:bodyPr/>
           <a:lstStyle/>
           <a:p>
-            <a:endParaRPr lang="en-US"/>
+            <a:r>
+              <a:rPr lang="en-US" dirty="0" smtClean="0"/>
+              <a:t>Abstraction</a:t>
+            </a:r>
+            <a:r>
+              <a:rPr lang="en-US" dirty="0" smtClean="0"/>
+              <a:t> of motor thrust and drag control force variation </a:t>
+            </a:r>
+            <a:r>
+              <a:rPr lang="en-US" dirty="0" smtClean="0"/>
+              <a:t>reduces attitude control to </a:t>
+            </a:r>
+            <a:r>
+              <a:rPr lang="en-US" i="1" dirty="0" smtClean="0"/>
+              <a:t>three angular loops</a:t>
+            </a:r>
+            <a:r>
+              <a:rPr lang="en-US" dirty="0" smtClean="0"/>
+              <a:t> whose o</a:t>
+            </a:r>
+            <a:r>
+              <a:rPr lang="en-US" dirty="0" smtClean="0"/>
+              <a:t>utputs are </a:t>
+            </a:r>
+            <a:r>
+              <a:rPr lang="en-US" dirty="0" smtClean="0"/>
+              <a:t>proportional to the required control </a:t>
+            </a:r>
+            <a:r>
+              <a:rPr lang="en-US" dirty="0" smtClean="0"/>
+              <a:t>forces, U2, U3 or U4.</a:t>
+            </a:r>
           </a:p>
         </p:txBody>
       </p:sp>
+      <p:pic>
+        <p:nvPicPr>
+          <p:cNvPr id="8" name="Picture 7"/>
+          <p:cNvPicPr>
+            <a:picLocks noChangeAspect="1"/>
+          </p:cNvPicPr>
+          <p:nvPr/>
+        </p:nvPicPr>
+        <p:blipFill>
+          <a:blip r:embed="rId2"/>
+          <a:srcRect t="27084" b="2949"/>
+          <a:stretch>
+            <a:fillRect/>
+          </a:stretch>
+        </p:blipFill>
+        <p:spPr>
+          <a:xfrm>
+            <a:off x="838200" y="3581400"/>
+            <a:ext cx="7091048" cy="2711904"/>
+          </a:xfrm>
+          <a:prstGeom prst="rect">
+            <a:avLst/>
+          </a:prstGeom>
+          <a:ln>
+            <a:noFill/>
+          </a:ln>
+          <a:effectLst>
+            <a:outerShdw blurRad="292100" dist="139700" dir="2700000" algn="tl" rotWithShape="0">
+              <a:srgbClr val="333333">
+                <a:alpha val="65000"/>
+              </a:srgbClr>
+            </a:outerShdw>
+          </a:effectLst>
+        </p:spPr>
+      </p:pic>
     </p:spTree>
   </p:cSld>
   <p:clrMapOvr>
@@ -14718,7 +14605,35 @@
       </p:sp>
       <p:sp>
         <p:nvSpPr>
-          <p:cNvPr id="4" name="Content Placeholder 3"/>
+          <p:cNvPr id="5" name="Footer Placeholder 5"/>
+          <p:cNvSpPr>
+            <a:spLocks noGrp="1"/>
+          </p:cNvSpPr>
+          <p:nvPr>
+            <p:ph type="ftr" sz="quarter" idx="11"/>
+          </p:nvPr>
+        </p:nvSpPr>
+        <p:spPr>
+          <a:xfrm>
+            <a:off x="609600" y="6248206"/>
+            <a:ext cx="5421083" cy="365125"/>
+          </a:xfrm>
+        </p:spPr>
+        <p:txBody>
+          <a:bodyPr/>
+          <a:lstStyle/>
+          <a:p>
+            <a:r>
+              <a:rPr lang="en-AU" smtClean="0"/>
+              <a:t>Tim Molloy</a:t>
+            </a:r>
+            <a:endParaRPr lang="en-AU" dirty="0"/>
+          </a:p>
+        </p:txBody>
+      </p:sp>
+      <p:sp>
+        <p:nvSpPr>
+          <p:cNvPr id="9" name="Content Placeholder 8"/>
           <p:cNvSpPr>
             <a:spLocks noGrp="1"/>
           </p:cNvSpPr>
@@ -14726,12 +14641,182 @@
             <p:ph sz="quarter" idx="1"/>
           </p:nvPr>
         </p:nvSpPr>
+        <p:spPr>
+          <a:xfrm>
+            <a:off x="612648" y="1600200"/>
+            <a:ext cx="8153400" cy="4724400"/>
+          </a:xfrm>
+        </p:spPr>
+        <p:txBody>
+          <a:bodyPr>
+            <a:normAutofit/>
+          </a:bodyPr>
+          <a:lstStyle/>
+          <a:p>
+            <a:r>
+              <a:rPr lang="en-US" dirty="0" smtClean="0"/>
+              <a:t>Three Angular Loops for Attitude Control plus Three positional control loops</a:t>
+            </a:r>
+          </a:p>
+          <a:p>
+            <a:pPr lvl="1"/>
+            <a:r>
+              <a:rPr lang="en-US" dirty="0" smtClean="0"/>
+              <a:t>Altitude Control with input U1</a:t>
+            </a:r>
+          </a:p>
+          <a:p>
+            <a:pPr lvl="1"/>
+            <a:r>
+              <a:rPr lang="en-US" dirty="0" err="1" smtClean="0"/>
+              <a:t>x</a:t>
+            </a:r>
+            <a:r>
+              <a:rPr lang="en-US" dirty="0" smtClean="0"/>
+              <a:t>-inertial position with roll and pitch loop </a:t>
+            </a:r>
+            <a:r>
+              <a:rPr lang="en-US" dirty="0" err="1" smtClean="0"/>
+              <a:t>setpoint</a:t>
+            </a:r>
+            <a:endParaRPr lang="en-US" dirty="0" smtClean="0"/>
+          </a:p>
+          <a:p>
+            <a:pPr lvl="1"/>
+            <a:r>
+              <a:rPr lang="en-US" dirty="0" err="1" smtClean="0"/>
+              <a:t>y</a:t>
+            </a:r>
+            <a:r>
+              <a:rPr lang="en-US" dirty="0" smtClean="0"/>
+              <a:t>-inertial position with roll and pitch loop </a:t>
+            </a:r>
+            <a:r>
+              <a:rPr lang="en-US" dirty="0" err="1" smtClean="0"/>
+              <a:t>setpoint</a:t>
+            </a:r>
+            <a:endParaRPr lang="en-US" dirty="0" smtClean="0"/>
+          </a:p>
+          <a:p>
+            <a:pPr lvl="1">
+              <a:buNone/>
+            </a:pPr>
+            <a:endParaRPr lang="en-US" dirty="0" smtClean="0"/>
+          </a:p>
+          <a:p>
+            <a:r>
+              <a:rPr lang="en-US" dirty="0" err="1" smtClean="0"/>
+              <a:t>x</a:t>
+            </a:r>
+            <a:r>
+              <a:rPr lang="en-US" dirty="0" smtClean="0"/>
+              <a:t> and </a:t>
+            </a:r>
+            <a:r>
+              <a:rPr lang="en-US" dirty="0" err="1" smtClean="0"/>
+              <a:t>y</a:t>
+            </a:r>
+            <a:r>
+              <a:rPr lang="en-US" dirty="0" smtClean="0"/>
+              <a:t> position control presents some challenges</a:t>
+            </a:r>
+          </a:p>
+          <a:p>
+            <a:pPr lvl="1"/>
+            <a:r>
+              <a:rPr lang="en-US" dirty="0" smtClean="0"/>
+              <a:t>Requires use of Body and Inertial Reference Frames</a:t>
+            </a:r>
+          </a:p>
+          <a:p>
+            <a:pPr lvl="1"/>
+            <a:r>
+              <a:rPr lang="en-US" dirty="0" smtClean="0"/>
+              <a:t>Velocity Control using pitch and roll angle bounding </a:t>
+            </a:r>
+          </a:p>
+        </p:txBody>
+      </p:sp>
+    </p:spTree>
+  </p:cSld>
+  <p:clrMapOvr>
+    <a:masterClrMapping/>
+  </p:clrMapOvr>
+  <p:timing>
+    <p:tnLst>
+      <p:par>
+        <p:cTn id="1" dur="indefinite" restart="never" nodeType="tmRoot"/>
+      </p:par>
+    </p:tnLst>
+  </p:timing>
+</p:sld>
+</file>
+
+<file path=ppt/slides/slide18.xml><?xml version="1.0" encoding="utf-8"?>
+<p:sld xmlns:a="http://schemas.openxmlformats.org/drawingml/2006/main" xmlns:r="http://schemas.openxmlformats.org/officeDocument/2006/relationships" xmlns:mc="http://schemas.openxmlformats.org/markup-compatibility/2006" xmlns:mv="urn:schemas-microsoft-com:mac:vml" xmlns:p="http://schemas.openxmlformats.org/presentationml/2006/main" mc:Ignorable="mv" mc:PreserveAttributes="mv:*">
+  <p:cSld>
+    <p:spTree>
+      <p:nvGrpSpPr>
+        <p:cNvPr id="1" name=""/>
+        <p:cNvGrpSpPr/>
+        <p:nvPr/>
+      </p:nvGrpSpPr>
+      <p:grpSpPr>
+        <a:xfrm>
+          <a:off x="0" y="0"/>
+          <a:ext cx="0" cy="0"/>
+          <a:chOff x="0" y="0"/>
+          <a:chExt cx="0" cy="0"/>
+        </a:xfrm>
+      </p:grpSpPr>
+      <p:sp>
+        <p:nvSpPr>
+          <p:cNvPr id="2" name="Title 1"/>
+          <p:cNvSpPr>
+            <a:spLocks noGrp="1"/>
+          </p:cNvSpPr>
+          <p:nvPr>
+            <p:ph type="title"/>
+          </p:nvPr>
+        </p:nvSpPr>
         <p:spPr/>
         <p:txBody>
-          <a:bodyPr/>
+          <a:bodyPr>
+            <a:normAutofit fontScale="90000"/>
+          </a:bodyPr>
           <a:lstStyle/>
           <a:p>
-            <a:endParaRPr lang="en-US"/>
+            <a:r>
+              <a:rPr lang="en-US" dirty="0" smtClean="0"/>
+              <a:t>Cascaded PID Guidance And Control</a:t>
+            </a:r>
+            <a:endParaRPr lang="en-US" dirty="0"/>
+          </a:p>
+        </p:txBody>
+      </p:sp>
+      <p:sp>
+        <p:nvSpPr>
+          <p:cNvPr id="3" name="Slide Number Placeholder 2"/>
+          <p:cNvSpPr>
+            <a:spLocks noGrp="1"/>
+          </p:cNvSpPr>
+          <p:nvPr>
+            <p:ph type="sldNum" sz="quarter" idx="12"/>
+          </p:nvPr>
+        </p:nvSpPr>
+        <p:spPr/>
+        <p:txBody>
+          <a:bodyPr>
+            <a:normAutofit fontScale="85000" lnSpcReduction="20000"/>
+          </a:bodyPr>
+          <a:lstStyle/>
+          <a:p>
+            <a:fld id="{5AEDDE57-BFB4-403C-8AD6-39A9EF93D28E}" type="slidenum">
+              <a:rPr lang="en-AU" smtClean="0"/>
+              <a:pPr/>
+              <a:t>18</a:t>
+            </a:fld>
+            <a:endParaRPr lang="en-AU"/>
           </a:p>
         </p:txBody>
       </p:sp>
@@ -14763,6 +14848,67 @@
           </a:p>
         </p:txBody>
       </p:sp>
+      <p:sp>
+        <p:nvSpPr>
+          <p:cNvPr id="9" name="Content Placeholder 8"/>
+          <p:cNvSpPr>
+            <a:spLocks noGrp="1"/>
+          </p:cNvSpPr>
+          <p:nvPr>
+            <p:ph sz="quarter" idx="1"/>
+          </p:nvPr>
+        </p:nvSpPr>
+        <p:spPr>
+          <a:xfrm>
+            <a:off x="612648" y="1600200"/>
+            <a:ext cx="8153400" cy="4724400"/>
+          </a:xfrm>
+        </p:spPr>
+        <p:txBody>
+          <a:bodyPr>
+            <a:normAutofit/>
+          </a:bodyPr>
+          <a:lstStyle/>
+          <a:p>
+            <a:endParaRPr lang="en-US" dirty="0" smtClean="0"/>
+          </a:p>
+        </p:txBody>
+      </p:sp>
+      <p:pic>
+        <p:nvPicPr>
+          <p:cNvPr id="7" name="Picture 6"/>
+          <p:cNvPicPr>
+            <a:picLocks noChangeAspect="1"/>
+          </p:cNvPicPr>
+          <p:nvPr/>
+        </p:nvPicPr>
+        <p:blipFill>
+          <a:blip r:embed="rId2"/>
+          <a:srcRect l="1509" t="15675" r="22539"/>
+          <a:stretch>
+            <a:fillRect/>
+          </a:stretch>
+        </p:blipFill>
+        <p:spPr>
+          <a:xfrm>
+            <a:off x="609600" y="1524000"/>
+            <a:ext cx="8317734" cy="5334000"/>
+          </a:xfrm>
+          <a:prstGeom prst="rect">
+            <a:avLst/>
+          </a:prstGeom>
+          <a:ln>
+            <a:noFill/>
+          </a:ln>
+          <a:effectLst>
+            <a:outerShdw blurRad="292100" dist="139700" dir="2700000" algn="tl" rotWithShape="0">
+              <a:srgbClr val="333333">
+                <a:alpha val="65000"/>
+              </a:srgbClr>
+            </a:outerShdw>
+          </a:effectLst>
+        </p:spPr>
+      </p:pic>
     </p:spTree>
   </p:cSld>
   <p:clrMapOvr>
@@ -15243,6 +15389,34 @@
       </p:grpSpPr>
       <p:sp>
         <p:nvSpPr>
+          <p:cNvPr id="6" name="Footer Placeholder 5"/>
+          <p:cNvSpPr>
+            <a:spLocks noGrp="1"/>
+          </p:cNvSpPr>
+          <p:nvPr>
+            <p:ph type="ftr" sz="quarter" idx="11"/>
+          </p:nvPr>
+        </p:nvSpPr>
+        <p:spPr>
+          <a:xfrm>
+            <a:off x="609600" y="6248206"/>
+            <a:ext cx="5421083" cy="365125"/>
+          </a:xfrm>
+        </p:spPr>
+        <p:txBody>
+          <a:bodyPr/>
+          <a:lstStyle/>
+          <a:p>
+            <a:r>
+              <a:rPr lang="en-AU" dirty="0" smtClean="0"/>
+              <a:t>Tim Molloy</a:t>
+            </a:r>
+            <a:endParaRPr lang="en-AU" dirty="0"/>
+          </a:p>
+        </p:txBody>
+      </p:sp>
+      <p:sp>
+        <p:nvSpPr>
           <p:cNvPr id="2" name="Title 1"/>
           <p:cNvSpPr>
             <a:spLocks noGrp="1"/>
@@ -15258,7 +15432,11 @@
           <a:p>
             <a:r>
               <a:rPr lang="en-US" dirty="0" smtClean="0"/>
-              <a:t>Role of the GCS and Control</a:t>
+              <a:t>Software </a:t>
+            </a:r>
+            <a:r>
+              <a:rPr lang="en-US" dirty="0" smtClean="0"/>
+              <a:t>Architecture</a:t>
             </a:r>
             <a:endParaRPr lang="en-US" dirty="0"/>
           </a:p>
@@ -15286,7 +15464,7 @@
               <a:pPr/>
               <a:t>6</a:t>
             </a:fld>
-            <a:endParaRPr lang="en-AU" dirty="0"/>
+            <a:endParaRPr lang="en-AU"/>
           </a:p>
         </p:txBody>
       </p:sp>
@@ -15302,70 +15480,48 @@
         </p:nvSpPr>
         <p:spPr/>
         <p:txBody>
-          <a:bodyPr>
-            <a:normAutofit fontScale="92500" lnSpcReduction="10000"/>
-          </a:bodyPr>
+          <a:bodyPr/>
           <a:lstStyle/>
           <a:p>
-            <a:r>
-              <a:rPr lang="en-AU" b="1" dirty="0" smtClean="0"/>
-              <a:t>HLO-4 Autonomous Hovering Flight</a:t>
-            </a:r>
-          </a:p>
-          <a:p>
-            <a:pPr>
-              <a:buNone/>
-            </a:pPr>
-            <a:r>
-              <a:rPr lang="en-AU" dirty="0" smtClean="0"/>
-              <a:t>	An autopilot system should be developed to enable sustained indoor autonomous hovering flight. The control system should be designed to enable future ingress and egress manoeuvre to longitudinal and hovering flight. </a:t>
-            </a:r>
-          </a:p>
-          <a:p>
-            <a:r>
-              <a:rPr lang="en-AU" b="1" dirty="0" smtClean="0"/>
-              <a:t>HLO-5 Ground Control Station</a:t>
-            </a:r>
-          </a:p>
-          <a:p>
-            <a:pPr>
-              <a:buNone/>
-            </a:pPr>
-            <a:r>
-              <a:rPr lang="en-AU" dirty="0" smtClean="0"/>
-              <a:t>	A ground control station that supports appropriate command and system setting inputs and data display and logging should be developed. The design should be derived from previous AHNS developments and enable future ground station developments.</a:t>
-            </a:r>
+            <a:endParaRPr lang="en-US" dirty="0"/>
           </a:p>
         </p:txBody>
       </p:sp>
-      <p:sp>
-        <p:nvSpPr>
-          <p:cNvPr id="5" name="Footer Placeholder 5"/>
-          <p:cNvSpPr>
-            <a:spLocks noGrp="1"/>
-          </p:cNvSpPr>
-          <p:nvPr>
-            <p:ph type="ftr" sz="quarter" idx="11"/>
-          </p:nvPr>
-        </p:nvSpPr>
+      <p:pic>
+        <p:nvPicPr>
+          <p:cNvPr id="5" name="Picture 4"/>
+          <p:cNvPicPr>
+            <a:picLocks noChangeAspect="1"/>
+          </p:cNvPicPr>
+          <p:nvPr/>
+        </p:nvPicPr>
+        <p:blipFill>
+          <a:blip r:embed="rId3"/>
+          <a:srcRect l="-2553" t="-1264" r="-377"/>
+          <a:stretch>
+            <a:fillRect/>
+          </a:stretch>
+        </p:blipFill>
         <p:spPr>
           <a:xfrm>
-            <a:off x="609600" y="6248206"/>
-            <a:ext cx="5421083" cy="365125"/>
+            <a:off x="533400" y="1447800"/>
+            <a:ext cx="8001000" cy="5166000"/>
           </a:xfrm>
+          <a:prstGeom prst="rect">
+            <a:avLst/>
+          </a:prstGeom>
+          <a:ln>
+            <a:noFill/>
+          </a:ln>
+          <a:effectLst>
+            <a:outerShdw blurRad="292100" dist="139700" dir="2700000" algn="tl" rotWithShape="0">
+              <a:srgbClr val="333333">
+                <a:alpha val="65000"/>
+              </a:srgbClr>
+            </a:outerShdw>
+          </a:effectLst>
         </p:spPr>
-        <p:txBody>
-          <a:bodyPr/>
-          <a:lstStyle/>
-          <a:p>
-            <a:r>
-              <a:rPr lang="en-AU" dirty="0" smtClean="0"/>
-              <a:t>Tim Molloy</a:t>
-            </a:r>
-            <a:endParaRPr lang="en-AU" dirty="0"/>
-          </a:p>
-        </p:txBody>
-      </p:sp>
+      </p:pic>
     </p:spTree>
   </p:cSld>
   <p:clrMapOvr>
@@ -15400,34 +15556,6 @@
       </p:grpSpPr>
       <p:sp>
         <p:nvSpPr>
-          <p:cNvPr id="6" name="Footer Placeholder 5"/>
-          <p:cNvSpPr>
-            <a:spLocks noGrp="1"/>
-          </p:cNvSpPr>
-          <p:nvPr>
-            <p:ph type="ftr" sz="quarter" idx="11"/>
-          </p:nvPr>
-        </p:nvSpPr>
-        <p:spPr>
-          <a:xfrm>
-            <a:off x="609600" y="6248206"/>
-            <a:ext cx="5421083" cy="365125"/>
-          </a:xfrm>
-        </p:spPr>
-        <p:txBody>
-          <a:bodyPr/>
-          <a:lstStyle/>
-          <a:p>
-            <a:r>
-              <a:rPr lang="en-AU" dirty="0" smtClean="0"/>
-              <a:t>Tim Molloy</a:t>
-            </a:r>
-            <a:endParaRPr lang="en-AU" dirty="0"/>
-          </a:p>
-        </p:txBody>
-      </p:sp>
-      <p:sp>
-        <p:nvSpPr>
           <p:cNvPr id="2" name="Title 1"/>
           <p:cNvSpPr>
             <a:spLocks noGrp="1"/>
@@ -15442,10 +15570,10 @@
           <a:lstStyle/>
           <a:p>
             <a:r>
-              <a:rPr lang="en-US" dirty="0" smtClean="0"/>
-              <a:t>Software Architecture</a:t>
-            </a:r>
-            <a:endParaRPr lang="en-US" dirty="0"/>
+              <a:rPr lang="en-AU" dirty="0" smtClean="0"/>
+              <a:t>Ground Control Station</a:t>
+            </a:r>
+            <a:endParaRPr lang="en-AU" dirty="0"/>
           </a:p>
         </p:txBody>
       </p:sp>
@@ -15470,140 +15598,6 @@
               <a:rPr lang="en-AU" smtClean="0"/>
               <a:pPr/>
               <a:t>7</a:t>
-            </a:fld>
-            <a:endParaRPr lang="en-AU"/>
-          </a:p>
-        </p:txBody>
-      </p:sp>
-      <p:sp>
-        <p:nvSpPr>
-          <p:cNvPr id="4" name="Content Placeholder 3"/>
-          <p:cNvSpPr>
-            <a:spLocks noGrp="1"/>
-          </p:cNvSpPr>
-          <p:nvPr>
-            <p:ph sz="quarter" idx="1"/>
-          </p:nvPr>
-        </p:nvSpPr>
-        <p:spPr/>
-        <p:txBody>
-          <a:bodyPr/>
-          <a:lstStyle/>
-          <a:p>
-            <a:endParaRPr lang="en-US" dirty="0"/>
-          </a:p>
-        </p:txBody>
-      </p:sp>
-      <p:pic>
-        <p:nvPicPr>
-          <p:cNvPr id="5" name="Picture 4"/>
-          <p:cNvPicPr>
-            <a:picLocks noChangeAspect="1"/>
-          </p:cNvPicPr>
-          <p:nvPr/>
-        </p:nvPicPr>
-        <p:blipFill>
-          <a:blip r:embed="rId3"/>
-          <a:stretch>
-            <a:fillRect/>
-          </a:stretch>
-        </p:blipFill>
-        <p:spPr>
-          <a:xfrm>
-            <a:off x="609600" y="1600200"/>
-            <a:ext cx="7391400" cy="4850882"/>
-          </a:xfrm>
-          <a:prstGeom prst="rect">
-            <a:avLst/>
-          </a:prstGeom>
-          <a:ln>
-            <a:noFill/>
-          </a:ln>
-          <a:effectLst>
-            <a:outerShdw blurRad="292100" dist="139700" dir="2700000" algn="tl" rotWithShape="0">
-              <a:srgbClr val="333333">
-                <a:alpha val="65000"/>
-              </a:srgbClr>
-            </a:outerShdw>
-          </a:effectLst>
-        </p:spPr>
-      </p:pic>
-    </p:spTree>
-  </p:cSld>
-  <p:clrMapOvr>
-    <a:masterClrMapping/>
-  </p:clrMapOvr>
-  <p:timing>
-    <p:tnLst>
-      <p:par>
-        <p:cTn id="1" dur="indefinite" restart="never" nodeType="tmRoot"/>
-      </p:par>
-    </p:tnLst>
-  </p:timing>
-</p:sld>
-</file>
-
-<file path=ppt/slides/slide8.xml><?xml version="1.0" encoding="utf-8"?>
-<p:sld xmlns:a="http://schemas.openxmlformats.org/drawingml/2006/main" xmlns:r="http://schemas.openxmlformats.org/officeDocument/2006/relationships" xmlns:mc="http://schemas.openxmlformats.org/markup-compatibility/2006" xmlns:mv="urn:schemas-microsoft-com:mac:vml" xmlns:p="http://schemas.openxmlformats.org/presentationml/2006/main" mc:Ignorable="mv" mc:PreserveAttributes="mv:*">
-  <p:cSld>
-    <p:spTree>
-      <p:nvGrpSpPr>
-        <p:cNvPr id="1" name=""/>
-        <p:cNvGrpSpPr/>
-        <p:nvPr/>
-      </p:nvGrpSpPr>
-      <p:grpSpPr>
-        <a:xfrm>
-          <a:off x="0" y="0"/>
-          <a:ext cx="0" cy="0"/>
-          <a:chOff x="0" y="0"/>
-          <a:chExt cx="0" cy="0"/>
-        </a:xfrm>
-      </p:grpSpPr>
-      <p:sp>
-        <p:nvSpPr>
-          <p:cNvPr id="2" name="Title 1"/>
-          <p:cNvSpPr>
-            <a:spLocks noGrp="1"/>
-          </p:cNvSpPr>
-          <p:nvPr>
-            <p:ph type="title"/>
-          </p:nvPr>
-        </p:nvSpPr>
-        <p:spPr/>
-        <p:txBody>
-          <a:bodyPr/>
-          <a:lstStyle/>
-          <a:p>
-            <a:r>
-              <a:rPr lang="en-AU" dirty="0" smtClean="0"/>
-              <a:t>Ground Control Station</a:t>
-            </a:r>
-            <a:endParaRPr lang="en-AU" dirty="0"/>
-          </a:p>
-        </p:txBody>
-      </p:sp>
-      <p:sp>
-        <p:nvSpPr>
-          <p:cNvPr id="3" name="Slide Number Placeholder 2"/>
-          <p:cNvSpPr>
-            <a:spLocks noGrp="1"/>
-          </p:cNvSpPr>
-          <p:nvPr>
-            <p:ph type="sldNum" sz="quarter" idx="12"/>
-          </p:nvPr>
-        </p:nvSpPr>
-        <p:spPr/>
-        <p:txBody>
-          <a:bodyPr>
-            <a:normAutofit fontScale="85000" lnSpcReduction="20000"/>
-          </a:bodyPr>
-          <a:lstStyle/>
-          <a:p>
-            <a:fld id="{5AEDDE57-BFB4-403C-8AD6-39A9EF93D28E}" type="slidenum">
-              <a:rPr lang="en-AU" smtClean="0"/>
-              <a:pPr/>
-              <a:t>8</a:t>
             </a:fld>
             <a:endParaRPr lang="en-AU" dirty="0"/>
           </a:p>
@@ -17132,7 +17126,7 @@
 </p:sld>
 </file>
 
-<file path=ppt/slides/slide9.xml><?xml version="1.0" encoding="utf-8"?>
+<file path=ppt/slides/slide8.xml><?xml version="1.0" encoding="utf-8"?>
 <p:sld xmlns:a="http://schemas.openxmlformats.org/drawingml/2006/main" xmlns:r="http://schemas.openxmlformats.org/officeDocument/2006/relationships" xmlns:mc="http://schemas.openxmlformats.org/markup-compatibility/2006" xmlns:mv="urn:schemas-microsoft-com:mac:vml" xmlns:p="http://schemas.openxmlformats.org/presentationml/2006/main" mc:Ignorable="mv" mc:PreserveAttributes="mv:*">
   <p:cSld>
     <p:spTree>
@@ -17194,7 +17188,7 @@
           <a:p>
             <a:r>
               <a:rPr lang="en-AU" dirty="0" smtClean="0"/>
-              <a:t>Ground Control Station</a:t>
+              <a:t>GCS GUI</a:t>
             </a:r>
             <a:endParaRPr lang="en-AU" dirty="0"/>
           </a:p>
@@ -17220,7 +17214,7 @@
             <a:fld id="{5AEDDE57-BFB4-403C-8AD6-39A9EF93D28E}" type="slidenum">
               <a:rPr lang="en-AU" smtClean="0"/>
               <a:pPr/>
-              <a:t>9</a:t>
+              <a:t>8</a:t>
             </a:fld>
             <a:endParaRPr lang="en-AU" dirty="0"/>
           </a:p>
@@ -17409,6 +17403,468 @@
                                         <p:cTn id="7" dur="1000"/>
                                         <p:tgtEl>
                                           <p:spTgt spid="9"/>
+                                        </p:tgtEl>
+                                      </p:cBhvr>
+                                    </p:animEffect>
+                                  </p:childTnLst>
+                                </p:cTn>
+                              </p:par>
+                            </p:childTnLst>
+                          </p:cTn>
+                        </p:par>
+                      </p:childTnLst>
+                    </p:cTn>
+                  </p:par>
+                </p:childTnLst>
+              </p:cTn>
+              <p:prevCondLst>
+                <p:cond evt="onPrev" delay="0">
+                  <p:tgtEl>
+                    <p:sldTgt/>
+                  </p:tgtEl>
+                </p:cond>
+              </p:prevCondLst>
+              <p:nextCondLst>
+                <p:cond evt="onNext" delay="0">
+                  <p:tgtEl>
+                    <p:sldTgt/>
+                  </p:tgtEl>
+                </p:cond>
+              </p:nextCondLst>
+            </p:seq>
+          </p:childTnLst>
+        </p:cTn>
+      </p:par>
+    </p:tnLst>
+  </p:timing>
+</p:sld>
+</file>
+
+<file path=ppt/slides/slide9.xml><?xml version="1.0" encoding="utf-8"?>
+<p:sld xmlns:a="http://schemas.openxmlformats.org/drawingml/2006/main" xmlns:r="http://schemas.openxmlformats.org/officeDocument/2006/relationships" xmlns:mc="http://schemas.openxmlformats.org/markup-compatibility/2006" xmlns:mv="urn:schemas-microsoft-com:mac:vml" xmlns:p="http://schemas.openxmlformats.org/presentationml/2006/main" mc:Ignorable="mv" mc:PreserveAttributes="mv:*">
+  <p:cSld>
+    <p:spTree>
+      <p:nvGrpSpPr>
+        <p:cNvPr id="1" name=""/>
+        <p:cNvGrpSpPr/>
+        <p:nvPr/>
+      </p:nvGrpSpPr>
+      <p:grpSpPr>
+        <a:xfrm>
+          <a:off x="0" y="0"/>
+          <a:ext cx="0" cy="0"/>
+          <a:chOff x="0" y="0"/>
+          <a:chExt cx="0" cy="0"/>
+        </a:xfrm>
+      </p:grpSpPr>
+      <p:sp>
+        <p:nvSpPr>
+          <p:cNvPr id="2" name="Title 1"/>
+          <p:cNvSpPr>
+            <a:spLocks noGrp="1"/>
+          </p:cNvSpPr>
+          <p:nvPr>
+            <p:ph type="title"/>
+          </p:nvPr>
+        </p:nvSpPr>
+        <p:spPr/>
+        <p:txBody>
+          <a:bodyPr/>
+          <a:lstStyle/>
+          <a:p>
+            <a:r>
+              <a:rPr lang="en-US" dirty="0" smtClean="0"/>
+              <a:t>The Widgets</a:t>
+            </a:r>
+            <a:endParaRPr lang="en-US" dirty="0"/>
+          </a:p>
+        </p:txBody>
+      </p:sp>
+      <p:sp>
+        <p:nvSpPr>
+          <p:cNvPr id="3" name="Slide Number Placeholder 2"/>
+          <p:cNvSpPr>
+            <a:spLocks noGrp="1"/>
+          </p:cNvSpPr>
+          <p:nvPr>
+            <p:ph type="sldNum" sz="quarter" idx="12"/>
+          </p:nvPr>
+        </p:nvSpPr>
+        <p:spPr/>
+        <p:txBody>
+          <a:bodyPr>
+            <a:normAutofit fontScale="85000" lnSpcReduction="20000"/>
+          </a:bodyPr>
+          <a:lstStyle/>
+          <a:p>
+            <a:fld id="{5AEDDE57-BFB4-403C-8AD6-39A9EF93D28E}" type="slidenum">
+              <a:rPr lang="en-AU" smtClean="0"/>
+              <a:pPr/>
+              <a:t>9</a:t>
+            </a:fld>
+            <a:endParaRPr lang="en-AU" dirty="0"/>
+          </a:p>
+        </p:txBody>
+      </p:sp>
+      <p:sp>
+        <p:nvSpPr>
+          <p:cNvPr id="4" name="Content Placeholder 3"/>
+          <p:cNvSpPr>
+            <a:spLocks noGrp="1"/>
+          </p:cNvSpPr>
+          <p:nvPr>
+            <p:ph sz="quarter" idx="1"/>
+          </p:nvPr>
+        </p:nvSpPr>
+        <p:spPr/>
+        <p:txBody>
+          <a:bodyPr>
+            <a:normAutofit fontScale="92500" lnSpcReduction="20000"/>
+          </a:bodyPr>
+          <a:lstStyle/>
+          <a:p>
+            <a:r>
+              <a:rPr lang="en-US" dirty="0" err="1" smtClean="0"/>
+              <a:t>WiFi</a:t>
+            </a:r>
+            <a:r>
+              <a:rPr lang="en-US" dirty="0" smtClean="0"/>
+              <a:t> Communications</a:t>
+            </a:r>
+          </a:p>
+          <a:p>
+            <a:pPr lvl="1"/>
+            <a:r>
+              <a:rPr lang="en-US" dirty="0" smtClean="0"/>
+              <a:t>Configure, Control and Monitor </a:t>
+            </a:r>
+            <a:br>
+              <a:rPr lang="en-US" dirty="0" smtClean="0"/>
+            </a:br>
+            <a:r>
+              <a:rPr lang="en-US" dirty="0" smtClean="0"/>
+              <a:t>UDP Telemetry</a:t>
+            </a:r>
+          </a:p>
+          <a:p>
+            <a:r>
+              <a:rPr lang="en-US" dirty="0" smtClean="0"/>
+              <a:t>Received Console</a:t>
+            </a:r>
+          </a:p>
+          <a:p>
+            <a:pPr lvl="1"/>
+            <a:r>
+              <a:rPr lang="en-US" dirty="0" smtClean="0"/>
+              <a:t>Report telemetry messages and </a:t>
+            </a:r>
+            <a:br>
+              <a:rPr lang="en-US" dirty="0" smtClean="0"/>
+            </a:br>
+            <a:r>
+              <a:rPr lang="en-US" dirty="0" smtClean="0"/>
+              <a:t>enable inspection</a:t>
+            </a:r>
+          </a:p>
+          <a:p>
+            <a:r>
+              <a:rPr lang="en-US" dirty="0" smtClean="0"/>
+              <a:t>System Status</a:t>
+            </a:r>
+          </a:p>
+          <a:p>
+            <a:pPr lvl="1"/>
+            <a:r>
+              <a:rPr lang="en-US" dirty="0" smtClean="0"/>
+              <a:t>Provide visual notifications of </a:t>
+            </a:r>
+            <a:br>
+              <a:rPr lang="en-US" dirty="0" smtClean="0"/>
+            </a:br>
+            <a:r>
+              <a:rPr lang="en-US" dirty="0" smtClean="0"/>
+              <a:t>airborne system status</a:t>
+            </a:r>
+          </a:p>
+          <a:p>
+            <a:r>
+              <a:rPr lang="en-US" dirty="0" smtClean="0"/>
+              <a:t>Data Logger</a:t>
+            </a:r>
+          </a:p>
+          <a:p>
+            <a:pPr lvl="1"/>
+            <a:r>
+              <a:rPr lang="en-US" dirty="0" smtClean="0"/>
+              <a:t>CSV Log of all Received Airborne Data</a:t>
+            </a:r>
+          </a:p>
+          <a:p>
+            <a:pPr lvl="1"/>
+            <a:endParaRPr lang="en-US" dirty="0" smtClean="0"/>
+          </a:p>
+        </p:txBody>
+      </p:sp>
+      <p:pic>
+        <p:nvPicPr>
+          <p:cNvPr id="5" name="Picture 4" descr="GCS_Screenshot.png"/>
+          <p:cNvPicPr>
+            <a:picLocks noChangeAspect="1"/>
+          </p:cNvPicPr>
+          <p:nvPr/>
+        </p:nvPicPr>
+        <p:blipFill>
+          <a:blip r:embed="rId2"/>
+          <a:srcRect l="86541" t="43432" b="44915"/>
+          <a:stretch>
+            <a:fillRect/>
+          </a:stretch>
+        </p:blipFill>
+        <p:spPr>
+          <a:xfrm>
+            <a:off x="6096000" y="1752600"/>
+            <a:ext cx="2710875" cy="838200"/>
+          </a:xfrm>
+          <a:prstGeom prst="rect">
+            <a:avLst/>
+          </a:prstGeom>
+          <a:ln>
+            <a:noFill/>
+          </a:ln>
+          <a:effectLst>
+            <a:outerShdw blurRad="292100" dist="139700" dir="2700000" algn="tl" rotWithShape="0">
+              <a:srgbClr val="333333">
+                <a:alpha val="65000"/>
+              </a:srgbClr>
+            </a:outerShdw>
+          </a:effectLst>
+        </p:spPr>
+      </p:pic>
+      <p:pic>
+        <p:nvPicPr>
+          <p:cNvPr id="6" name="Picture 5" descr="GCS_Screenshot.png"/>
+          <p:cNvPicPr>
+            <a:picLocks noChangeAspect="1"/>
+          </p:cNvPicPr>
+          <p:nvPr/>
+        </p:nvPicPr>
+        <p:blipFill>
+          <a:blip r:embed="rId2"/>
+          <a:srcRect l="86541" t="55085" b="26907"/>
+          <a:stretch>
+            <a:fillRect/>
+          </a:stretch>
+        </p:blipFill>
+        <p:spPr>
+          <a:xfrm>
+            <a:off x="6096000" y="2743200"/>
+            <a:ext cx="2710875" cy="1295400"/>
+          </a:xfrm>
+          <a:prstGeom prst="rect">
+            <a:avLst/>
+          </a:prstGeom>
+          <a:ln>
+            <a:noFill/>
+          </a:ln>
+          <a:effectLst>
+            <a:outerShdw blurRad="292100" dist="139700" dir="2700000" algn="tl" rotWithShape="0">
+              <a:srgbClr val="333333">
+                <a:alpha val="65000"/>
+              </a:srgbClr>
+            </a:outerShdw>
+          </a:effectLst>
+        </p:spPr>
+      </p:pic>
+      <p:pic>
+        <p:nvPicPr>
+          <p:cNvPr id="8" name="Picture 7" descr="GCS_Screenshot.png"/>
+          <p:cNvPicPr>
+            <a:picLocks noChangeAspect="1"/>
+          </p:cNvPicPr>
+          <p:nvPr/>
+        </p:nvPicPr>
+        <p:blipFill>
+          <a:blip r:embed="rId2"/>
+          <a:srcRect l="86541" t="29661" b="56568"/>
+          <a:stretch>
+            <a:fillRect/>
+          </a:stretch>
+        </p:blipFill>
+        <p:spPr>
+          <a:xfrm>
+            <a:off x="6096000" y="4191000"/>
+            <a:ext cx="2710875" cy="990600"/>
+          </a:xfrm>
+          <a:prstGeom prst="rect">
+            <a:avLst/>
+          </a:prstGeom>
+          <a:ln>
+            <a:noFill/>
+          </a:ln>
+          <a:effectLst>
+            <a:outerShdw blurRad="292100" dist="139700" dir="2700000" algn="tl" rotWithShape="0">
+              <a:srgbClr val="333333">
+                <a:alpha val="65000"/>
+              </a:srgbClr>
+            </a:outerShdw>
+          </a:effectLst>
+        </p:spPr>
+      </p:pic>
+      <p:sp>
+        <p:nvSpPr>
+          <p:cNvPr id="9" name="Footer Placeholder 5"/>
+          <p:cNvSpPr>
+            <a:spLocks noGrp="1"/>
+          </p:cNvSpPr>
+          <p:nvPr>
+            <p:ph type="ftr" sz="quarter" idx="11"/>
+          </p:nvPr>
+        </p:nvSpPr>
+        <p:spPr>
+          <a:xfrm>
+            <a:off x="609600" y="6248206"/>
+            <a:ext cx="5421083" cy="365125"/>
+          </a:xfrm>
+        </p:spPr>
+        <p:txBody>
+          <a:bodyPr/>
+          <a:lstStyle/>
+          <a:p>
+            <a:r>
+              <a:rPr lang="en-AU" smtClean="0"/>
+              <a:t>Tim Molloy</a:t>
+            </a:r>
+            <a:endParaRPr lang="en-AU" dirty="0"/>
+          </a:p>
+        </p:txBody>
+      </p:sp>
+    </p:spTree>
+  </p:cSld>
+  <p:clrMapOvr>
+    <a:masterClrMapping/>
+  </p:clrMapOvr>
+  <p:timing>
+    <p:tnLst>
+      <p:par>
+        <p:cTn id="1" dur="indefinite" restart="never" nodeType="tmRoot">
+          <p:childTnLst>
+            <p:seq concurrent="1" nextAc="seek">
+              <p:cTn id="2" dur="indefinite" nodeType="mainSeq">
+                <p:childTnLst>
+                  <p:par>
+                    <p:cTn id="3" fill="hold">
+                      <p:stCondLst>
+                        <p:cond delay="indefinite"/>
+                        <p:cond evt="onBegin" delay="0">
+                          <p:tn val="2"/>
+                        </p:cond>
+                      </p:stCondLst>
+                      <p:childTnLst>
+                        <p:par>
+                          <p:cTn id="4" fill="hold">
+                            <p:stCondLst>
+                              <p:cond delay="0"/>
+                            </p:stCondLst>
+                            <p:childTnLst>
+                              <p:par>
+                                <p:cTn id="5" presetID="10" presetClass="entr" presetSubtype="0" fill="hold" nodeType="withEffect">
+                                  <p:stCondLst>
+                                    <p:cond delay="0"/>
+                                  </p:stCondLst>
+                                  <p:childTnLst>
+                                    <p:set>
+                                      <p:cBhvr>
+                                        <p:cTn id="6" dur="1" fill="hold">
+                                          <p:stCondLst>
+                                            <p:cond delay="0"/>
+                                          </p:stCondLst>
+                                        </p:cTn>
+                                        <p:tgtEl>
+                                          <p:spTgt spid="5"/>
+                                        </p:tgtEl>
+                                        <p:attrNameLst>
+                                          <p:attrName>style.visibility</p:attrName>
+                                        </p:attrNameLst>
+                                      </p:cBhvr>
+                                      <p:to>
+                                        <p:strVal val="visible"/>
+                                      </p:to>
+                                    </p:set>
+                                    <p:animEffect transition="in" filter="fade">
+                                      <p:cBhvr>
+                                        <p:cTn id="7" dur="1000"/>
+                                        <p:tgtEl>
+                                          <p:spTgt spid="5"/>
+                                        </p:tgtEl>
+                                      </p:cBhvr>
+                                    </p:animEffect>
+                                  </p:childTnLst>
+                                </p:cTn>
+                              </p:par>
+                              <p:par>
+                                <p:cTn id="8" presetID="10" presetClass="entr" presetSubtype="0" fill="hold" nodeType="withEffect">
+                                  <p:stCondLst>
+                                    <p:cond delay="0"/>
+                                  </p:stCondLst>
+                                  <p:childTnLst>
+                                    <p:set>
+                                      <p:cBhvr>
+                                        <p:cTn id="9" dur="1" fill="hold">
+                                          <p:stCondLst>
+                                            <p:cond delay="0"/>
+                                          </p:stCondLst>
+                                        </p:cTn>
+                                        <p:tgtEl>
+                                          <p:spTgt spid="6"/>
+                                        </p:tgtEl>
+                                        <p:attrNameLst>
+                                          <p:attrName>style.visibility</p:attrName>
+                                        </p:attrNameLst>
+                                      </p:cBhvr>
+                                      <p:to>
+                                        <p:strVal val="visible"/>
+                                      </p:to>
+                                    </p:set>
+                                    <p:animEffect transition="in" filter="fade">
+                                      <p:cBhvr>
+                                        <p:cTn id="10" dur="1000"/>
+                                        <p:tgtEl>
+                                          <p:spTgt spid="6"/>
+                                        </p:tgtEl>
+                                      </p:cBhvr>
+                                    </p:animEffect>
+                                  </p:childTnLst>
+                                </p:cTn>
+                              </p:par>
+                              <p:par>
+                                <p:cTn id="11" presetID="10" presetClass="entr" presetSubtype="0" fill="hold" nodeType="withEffect">
+                                  <p:stCondLst>
+                                    <p:cond delay="0"/>
+                                  </p:stCondLst>
+                                  <p:childTnLst>
+                                    <p:set>
+                                      <p:cBhvr>
+                                        <p:cTn id="12" dur="1" fill="hold">
+                                          <p:stCondLst>
+                                            <p:cond delay="0"/>
+                                          </p:stCondLst>
+                                        </p:cTn>
+                                        <p:tgtEl>
+                                          <p:spTgt spid="8"/>
+                                        </p:tgtEl>
+                                        <p:attrNameLst>
+                                          <p:attrName>style.visibility</p:attrName>
+                                        </p:attrNameLst>
+                                      </p:cBhvr>
+                                      <p:to>
+                                        <p:strVal val="visible"/>
+                                      </p:to>
+                                    </p:set>
+                                    <p:animEffect transition="in" filter="fade">
+                                      <p:cBhvr>
+                                        <p:cTn id="13" dur="1000"/>
+                                        <p:tgtEl>
+                                          <p:spTgt spid="8"/>
                                         </p:tgtEl>
                                       </p:cBhvr>
                                     </p:animEffect>

</xml_diff>